<commit_message>
Modify command style for both earnings and payment
</commit_message>
<xml_diff>
--- a/docs/diagrams/EditPaymentSequenceDiagram.pptx
+++ b/docs/diagrams/EditPaymentSequenceDiagram.pptx
@@ -3909,8 +3909,8 @@
         </p:nvSpPr>
         <p:spPr>
           <a:xfrm>
-            <a:off x="395482" y="907628"/>
-            <a:ext cx="1557488" cy="338554"/>
+            <a:off x="72851" y="968516"/>
+            <a:ext cx="1880119" cy="169277"/>
           </a:xfrm>
           <a:prstGeom prst="rect">
             <a:avLst/>
@@ -3929,23 +3929,7 @@
                   <a:srgbClr val="0070C0"/>
                 </a:solidFill>
               </a:rPr>
-              <a:t>execute( “paid </a:t>
-            </a:r>
-            <a:r>
-              <a:rPr lang="en-US" sz="1100" dirty="0" err="1">
-                <a:solidFill>
-                  <a:srgbClr val="0070C0"/>
-                </a:solidFill>
-              </a:rPr>
-              <a:t>idx</a:t>
-            </a:r>
-            <a:r>
-              <a:rPr lang="en-US" sz="1100" dirty="0">
-                <a:solidFill>
-                  <a:srgbClr val="0070C0"/>
-                </a:solidFill>
-              </a:rPr>
-              <a:t>/1 amt/200 m/8 y/2018”)</a:t>
+              <a:t>execute( “paid 1 200 8 2018”)</a:t>
             </a:r>
           </a:p>
         </p:txBody>
@@ -4209,7 +4193,7 @@
         <p:spPr>
           <a:xfrm>
             <a:off x="2028316" y="995423"/>
-            <a:ext cx="2211727" cy="338554"/>
+            <a:ext cx="2211727" cy="169277"/>
           </a:xfrm>
           <a:prstGeom prst="rect">
             <a:avLst/>
@@ -4240,15 +4224,7 @@
             </a:r>
             <a:r>
               <a:rPr lang="en-US" sz="1100" dirty="0"/>
-              <a:t>(“paid </a:t>
-            </a:r>
-            <a:r>
-              <a:rPr lang="en-US" sz="1100" dirty="0" err="1"/>
-              <a:t>idx</a:t>
-            </a:r>
-            <a:r>
-              <a:rPr lang="en-US" sz="1100" dirty="0"/>
-              <a:t>/1 amt/200 m/8 y/2018”)</a:t>
+              <a:t>(“paid 1 200 8 2018”)</a:t>
             </a:r>
           </a:p>
         </p:txBody>
@@ -5585,7 +5561,7 @@
         <p:spPr>
           <a:xfrm>
             <a:off x="4343881" y="2084332"/>
-            <a:ext cx="1078458" cy="646331"/>
+            <a:ext cx="1078458" cy="461665"/>
           </a:xfrm>
           <a:prstGeom prst="rect">
             <a:avLst/>
@@ -5598,29 +5574,21 @@
           </a:bodyPr>
           <a:lstStyle/>
           <a:p>
+            <a:r>
+              <a:rPr lang="en-GB" sz="1200">
+                <a:solidFill>
+                  <a:schemeClr val="accent1"/>
+                </a:solidFill>
+              </a:rPr>
+              <a:t>Parse(“1 200 8 2018</a:t>
+            </a:r>
             <a:r>
               <a:rPr lang="en-GB" sz="1200" dirty="0">
                 <a:solidFill>
                   <a:schemeClr val="accent1"/>
                 </a:solidFill>
               </a:rPr>
-              <a:t>Parse(“</a:t>
-            </a:r>
-            <a:r>
-              <a:rPr lang="en-GB" sz="1200" dirty="0" err="1">
-                <a:solidFill>
-                  <a:schemeClr val="accent1"/>
-                </a:solidFill>
-              </a:rPr>
-              <a:t>idx</a:t>
-            </a:r>
-            <a:r>
-              <a:rPr lang="en-GB" sz="1200" dirty="0">
-                <a:solidFill>
-                  <a:schemeClr val="accent1"/>
-                </a:solidFill>
-              </a:rPr>
-              <a:t>/1 amt/200 m/8 y/2018”)</a:t>
+              <a:t>”)</a:t>
             </a:r>
           </a:p>
         </p:txBody>

</xml_diff>

<commit_message>
Edit EditPaymentSequenceDiagram: refactor to Student and ammends
</commit_message>
<xml_diff>
--- a/docs/diagrams/EditPaymentSequenceDiagram.pptx
+++ b/docs/diagrams/EditPaymentSequenceDiagram.pptx
@@ -197,7 +197,7 @@
           <a:p>
             <a:fld id="{62511F6D-3957-4073-A6EA-8AA084D57D2E}" type="datetimeFigureOut">
               <a:rPr lang="en-US" smtClean="0"/>
-              <a:t>10/23/2018</a:t>
+              <a:t>11/10/2018</a:t>
             </a:fld>
             <a:endParaRPr lang="en-US"/>
           </a:p>
@@ -795,7 +795,7 @@
           <a:p>
             <a:fld id="{78C97017-6FC3-485B-9764-EAC9E56C1D49}" type="datetimeFigureOut">
               <a:rPr lang="en-US" smtClean="0"/>
-              <a:t>10/23/2018</a:t>
+              <a:t>11/10/2018</a:t>
             </a:fld>
             <a:endParaRPr lang="en-US"/>
           </a:p>
@@ -963,7 +963,7 @@
           <a:p>
             <a:fld id="{78C97017-6FC3-485B-9764-EAC9E56C1D49}" type="datetimeFigureOut">
               <a:rPr lang="en-US" smtClean="0"/>
-              <a:t>10/23/2018</a:t>
+              <a:t>11/10/2018</a:t>
             </a:fld>
             <a:endParaRPr lang="en-US"/>
           </a:p>
@@ -1141,7 +1141,7 @@
           <a:p>
             <a:fld id="{78C97017-6FC3-485B-9764-EAC9E56C1D49}" type="datetimeFigureOut">
               <a:rPr lang="en-US" smtClean="0"/>
-              <a:t>10/23/2018</a:t>
+              <a:t>11/10/2018</a:t>
             </a:fld>
             <a:endParaRPr lang="en-US"/>
           </a:p>
@@ -1309,7 +1309,7 @@
           <a:p>
             <a:fld id="{78C97017-6FC3-485B-9764-EAC9E56C1D49}" type="datetimeFigureOut">
               <a:rPr lang="en-US" smtClean="0"/>
-              <a:t>10/23/2018</a:t>
+              <a:t>11/10/2018</a:t>
             </a:fld>
             <a:endParaRPr lang="en-US"/>
           </a:p>
@@ -1554,7 +1554,7 @@
           <a:p>
             <a:fld id="{78C97017-6FC3-485B-9764-EAC9E56C1D49}" type="datetimeFigureOut">
               <a:rPr lang="en-US" smtClean="0"/>
-              <a:t>10/23/2018</a:t>
+              <a:t>11/10/2018</a:t>
             </a:fld>
             <a:endParaRPr lang="en-US"/>
           </a:p>
@@ -1839,7 +1839,7 @@
           <a:p>
             <a:fld id="{78C97017-6FC3-485B-9764-EAC9E56C1D49}" type="datetimeFigureOut">
               <a:rPr lang="en-US" smtClean="0"/>
-              <a:t>10/23/2018</a:t>
+              <a:t>11/10/2018</a:t>
             </a:fld>
             <a:endParaRPr lang="en-US"/>
           </a:p>
@@ -2258,7 +2258,7 @@
           <a:p>
             <a:fld id="{78C97017-6FC3-485B-9764-EAC9E56C1D49}" type="datetimeFigureOut">
               <a:rPr lang="en-US" smtClean="0"/>
-              <a:t>10/23/2018</a:t>
+              <a:t>11/10/2018</a:t>
             </a:fld>
             <a:endParaRPr lang="en-US"/>
           </a:p>
@@ -2375,7 +2375,7 @@
           <a:p>
             <a:fld id="{78C97017-6FC3-485B-9764-EAC9E56C1D49}" type="datetimeFigureOut">
               <a:rPr lang="en-US" smtClean="0"/>
-              <a:t>10/23/2018</a:t>
+              <a:t>11/10/2018</a:t>
             </a:fld>
             <a:endParaRPr lang="en-US"/>
           </a:p>
@@ -2470,7 +2470,7 @@
           <a:p>
             <a:fld id="{78C97017-6FC3-485B-9764-EAC9E56C1D49}" type="datetimeFigureOut">
               <a:rPr lang="en-US" smtClean="0"/>
-              <a:t>10/23/2018</a:t>
+              <a:t>11/10/2018</a:t>
             </a:fld>
             <a:endParaRPr lang="en-US"/>
           </a:p>
@@ -2745,7 +2745,7 @@
           <a:p>
             <a:fld id="{78C97017-6FC3-485B-9764-EAC9E56C1D49}" type="datetimeFigureOut">
               <a:rPr lang="en-US" smtClean="0"/>
-              <a:t>10/23/2018</a:t>
+              <a:t>11/10/2018</a:t>
             </a:fld>
             <a:endParaRPr lang="en-US"/>
           </a:p>
@@ -2997,7 +2997,7 @@
           <a:p>
             <a:fld id="{78C97017-6FC3-485B-9764-EAC9E56C1D49}" type="datetimeFigureOut">
               <a:rPr lang="en-US" smtClean="0"/>
-              <a:t>10/23/2018</a:t>
+              <a:t>11/10/2018</a:t>
             </a:fld>
             <a:endParaRPr lang="en-US"/>
           </a:p>
@@ -3208,7 +3208,7 @@
           <a:p>
             <a:fld id="{78C97017-6FC3-485B-9764-EAC9E56C1D49}" type="datetimeFigureOut">
               <a:rPr lang="en-US" smtClean="0"/>
-              <a:t>10/23/2018</a:t>
+              <a:t>11/10/2018</a:t>
             </a:fld>
             <a:endParaRPr lang="en-US"/>
           </a:p>
@@ -3597,8 +3597,8 @@
         </p:nvSpPr>
         <p:spPr>
           <a:xfrm>
-            <a:off x="9208697" y="851007"/>
-            <a:ext cx="1357863" cy="5859923"/>
+            <a:off x="9513560" y="137181"/>
+            <a:ext cx="1357863" cy="6029200"/>
           </a:xfrm>
           <a:prstGeom prst="roundRect">
             <a:avLst>
@@ -3657,8 +3657,8 @@
         </p:nvSpPr>
         <p:spPr>
           <a:xfrm>
-            <a:off x="2135733" y="847633"/>
-            <a:ext cx="7012450" cy="5859923"/>
+            <a:off x="611732" y="137181"/>
+            <a:ext cx="8837067" cy="6029200"/>
           </a:xfrm>
           <a:prstGeom prst="roundRect">
             <a:avLst>
@@ -3720,7 +3720,7 @@
         </p:nvSpPr>
         <p:spPr>
           <a:xfrm>
-            <a:off x="2369046" y="1260237"/>
+            <a:off x="845046" y="482841"/>
             <a:ext cx="1455629" cy="346760"/>
           </a:xfrm>
           <a:prstGeom prst="rect">
@@ -3793,7 +3793,7 @@
         </p:nvCxnSpPr>
         <p:spPr>
           <a:xfrm>
-            <a:off x="3096860" y="1606998"/>
+            <a:off x="1572860" y="829602"/>
             <a:ext cx="0" cy="3650803"/>
           </a:xfrm>
           <a:prstGeom prst="line">
@@ -3830,8 +3830,8 @@
         </p:nvSpPr>
         <p:spPr>
           <a:xfrm>
-            <a:off x="3024850" y="1600201"/>
-            <a:ext cx="121416" cy="4860666"/>
+            <a:off x="1500850" y="912165"/>
+            <a:ext cx="134932" cy="5007526"/>
           </a:xfrm>
           <a:prstGeom prst="rect">
             <a:avLst/>
@@ -3882,7 +3882,7 @@
         </p:nvSpPr>
         <p:spPr>
           <a:xfrm>
-            <a:off x="4267200" y="1143000"/>
+            <a:off x="2743200" y="365604"/>
             <a:ext cx="1219200" cy="467684"/>
           </a:xfrm>
           <a:prstGeom prst="rect">
@@ -3958,8 +3958,8 @@
         </p:nvCxnSpPr>
         <p:spPr>
           <a:xfrm>
-            <a:off x="4876801" y="1610684"/>
-            <a:ext cx="3799" cy="2748594"/>
+            <a:off x="3352800" y="833288"/>
+            <a:ext cx="0" cy="2213910"/>
           </a:xfrm>
           <a:prstGeom prst="line">
             <a:avLst/>
@@ -3995,8 +3995,8 @@
         </p:nvSpPr>
         <p:spPr>
           <a:xfrm>
-            <a:off x="4769945" y="1626318"/>
-            <a:ext cx="224682" cy="2489871"/>
+            <a:off x="3272374" y="917791"/>
+            <a:ext cx="155699" cy="1999143"/>
           </a:xfrm>
           <a:prstGeom prst="rect">
             <a:avLst/>
@@ -4047,8 +4047,8 @@
         </p:nvSpPr>
         <p:spPr>
           <a:xfrm>
-            <a:off x="6737821" y="2343862"/>
-            <a:ext cx="850026" cy="358365"/>
+            <a:off x="5213820" y="1566467"/>
+            <a:ext cx="852827" cy="317402"/>
           </a:xfrm>
           <a:prstGeom prst="rect">
             <a:avLst/>
@@ -4110,7 +4110,7 @@
         </p:nvCxnSpPr>
         <p:spPr>
           <a:xfrm>
-            <a:off x="7151253" y="2681425"/>
+            <a:off x="5627253" y="2140249"/>
             <a:ext cx="28210" cy="2686588"/>
           </a:xfrm>
           <a:prstGeom prst="line">
@@ -4147,7 +4147,7 @@
         </p:nvSpPr>
         <p:spPr>
           <a:xfrm>
-            <a:off x="7086601" y="2673980"/>
+            <a:off x="5562601" y="1896584"/>
             <a:ext cx="117613" cy="185051"/>
           </a:xfrm>
           <a:prstGeom prst="rect">
@@ -4201,7 +4201,7 @@
         </p:nvCxnSpPr>
         <p:spPr>
           <a:xfrm>
-            <a:off x="1905001" y="1978290"/>
+            <a:off x="380999" y="929330"/>
             <a:ext cx="1119851" cy="0"/>
           </a:xfrm>
           <a:prstGeom prst="straightConnector1">
@@ -4239,8 +4239,8 @@
         </p:nvCxnSpPr>
         <p:spPr>
           <a:xfrm flipV="1">
-            <a:off x="3177251" y="1902898"/>
-            <a:ext cx="1596514" cy="1"/>
+            <a:off x="1653251" y="1125503"/>
+            <a:ext cx="1619123" cy="1"/>
           </a:xfrm>
           <a:prstGeom prst="straightConnector1">
             <a:avLst/>
@@ -4275,7 +4275,7 @@
         </p:nvSpPr>
         <p:spPr>
           <a:xfrm>
-            <a:off x="1524000" y="2051160"/>
+            <a:off x="13336" y="990595"/>
             <a:ext cx="1424846" cy="369332"/>
           </a:xfrm>
           <a:prstGeom prst="rect">
@@ -4348,7 +4348,7 @@
         </p:nvCxnSpPr>
         <p:spPr>
           <a:xfrm>
-            <a:off x="6342085" y="2551312"/>
+            <a:off x="4818085" y="1773916"/>
             <a:ext cx="383077" cy="0"/>
           </a:xfrm>
           <a:prstGeom prst="straightConnector1">
@@ -4384,7 +4384,7 @@
         </p:nvSpPr>
         <p:spPr>
           <a:xfrm>
-            <a:off x="4876801" y="4191000"/>
+            <a:off x="3352801" y="2918304"/>
             <a:ext cx="855809" cy="215444"/>
           </a:xfrm>
           <a:prstGeom prst="rect">
@@ -4428,7 +4428,7 @@
         </p:nvCxnSpPr>
         <p:spPr>
           <a:xfrm>
-            <a:off x="6350241" y="2854331"/>
+            <a:off x="4826241" y="2076935"/>
             <a:ext cx="809294" cy="2043"/>
           </a:xfrm>
           <a:prstGeom prst="straightConnector1">
@@ -4468,7 +4468,7 @@
         </p:nvCxnSpPr>
         <p:spPr>
           <a:xfrm flipV="1">
-            <a:off x="3159848" y="4109422"/>
+            <a:off x="1635848" y="2903782"/>
             <a:ext cx="1630852" cy="13156"/>
           </a:xfrm>
           <a:prstGeom prst="straightConnector1">
@@ -4508,7 +4508,7 @@
         </p:nvCxnSpPr>
         <p:spPr>
           <a:xfrm>
-            <a:off x="1828801" y="6324600"/>
+            <a:off x="304801" y="5783424"/>
             <a:ext cx="1196051" cy="0"/>
           </a:xfrm>
           <a:prstGeom prst="straightConnector1">
@@ -4546,7 +4546,7 @@
         </p:nvSpPr>
         <p:spPr>
           <a:xfrm>
-            <a:off x="9470411" y="5486400"/>
+            <a:off x="9808430" y="4945224"/>
             <a:ext cx="878029" cy="228600"/>
           </a:xfrm>
           <a:prstGeom prst="rect">
@@ -4615,7 +4615,7 @@
         </p:nvCxnSpPr>
         <p:spPr>
           <a:xfrm>
-            <a:off x="3146266" y="4429348"/>
+            <a:off x="1622266" y="3156652"/>
             <a:ext cx="3972124" cy="4742"/>
           </a:xfrm>
           <a:prstGeom prst="straightConnector1">
@@ -4651,8 +4651,8 @@
         </p:nvSpPr>
         <p:spPr>
           <a:xfrm>
-            <a:off x="7123895" y="4417678"/>
-            <a:ext cx="108529" cy="1942402"/>
+            <a:off x="5599895" y="3155974"/>
+            <a:ext cx="88177" cy="2662930"/>
           </a:xfrm>
           <a:prstGeom prst="rect">
             <a:avLst/>
@@ -4706,7 +4706,7 @@
         </p:nvCxnSpPr>
         <p:spPr>
           <a:xfrm>
-            <a:off x="9909425" y="5715001"/>
+            <a:off x="10247444" y="5173825"/>
             <a:ext cx="13180" cy="904239"/>
           </a:xfrm>
           <a:prstGeom prst="line">
@@ -4746,7 +4746,7 @@
         </p:nvSpPr>
         <p:spPr>
           <a:xfrm>
-            <a:off x="9849698" y="5769495"/>
+            <a:off x="10187717" y="5250693"/>
             <a:ext cx="119322" cy="45719"/>
           </a:xfrm>
           <a:prstGeom prst="rect">
@@ -4807,7 +4807,7 @@
         </p:nvCxnSpPr>
         <p:spPr>
           <a:xfrm>
-            <a:off x="7202960" y="5948151"/>
+            <a:off x="5678960" y="5475555"/>
             <a:ext cx="183778" cy="5627"/>
           </a:xfrm>
           <a:prstGeom prst="straightConnector1">
@@ -4840,14 +4840,13 @@
           <p:cNvPr id="76" name="Straight Arrow Connector 75"/>
           <p:cNvCxnSpPr>
             <a:cxnSpLocks/>
-            <a:endCxn id="73" idx="2"/>
           </p:cNvCxnSpPr>
           <p:nvPr/>
         </p:nvCxnSpPr>
         <p:spPr>
           <a:xfrm>
-            <a:off x="7232423" y="5792593"/>
-            <a:ext cx="2676936" cy="22620"/>
+            <a:off x="5708424" y="5274037"/>
+            <a:ext cx="4538954" cy="0"/>
           </a:xfrm>
           <a:prstGeom prst="straightConnector1">
             <a:avLst/>
@@ -4890,8 +4889,8 @@
         </p:nvCxnSpPr>
         <p:spPr>
           <a:xfrm flipV="1">
-            <a:off x="2749771" y="6360080"/>
-            <a:ext cx="4428389" cy="2"/>
+            <a:off x="1225771" y="5818904"/>
+            <a:ext cx="4418213" cy="2"/>
           </a:xfrm>
           <a:prstGeom prst="straightConnector1">
             <a:avLst/>
@@ -4928,8 +4927,8 @@
         </p:nvSpPr>
         <p:spPr>
           <a:xfrm>
-            <a:off x="7588715" y="5466040"/>
-            <a:ext cx="1424846" cy="123111"/>
+            <a:off x="6136076" y="4927294"/>
+            <a:ext cx="1800153" cy="123111"/>
           </a:xfrm>
           <a:prstGeom prst="rect">
             <a:avLst/>
@@ -4960,7 +4959,7 @@
                 </a:solidFill>
                 <a:latin typeface="Calibri"/>
               </a:rPr>
-              <a:t>updatePerson</a:t>
+              <a:t>updateStudentInternalField</a:t>
             </a:r>
             <a:r>
               <a:rPr lang="en-US" sz="800" dirty="0">
@@ -4969,7 +4968,7 @@
                 </a:solidFill>
                 <a:latin typeface="Calibri"/>
               </a:rPr>
-              <a:t>(edited)</a:t>
+              <a:t>(t, edited)</a:t>
             </a:r>
           </a:p>
         </p:txBody>
@@ -4982,7 +4981,7 @@
         </p:nvSpPr>
         <p:spPr>
           <a:xfrm>
-            <a:off x="5076696" y="2525773"/>
+            <a:off x="3552696" y="1620361"/>
             <a:ext cx="884073" cy="553998"/>
           </a:xfrm>
           <a:prstGeom prst="rect">
@@ -5048,7 +5047,7 @@
         </p:nvSpPr>
         <p:spPr>
           <a:xfrm>
-            <a:off x="3266982" y="1676401"/>
+            <a:off x="1742982" y="899005"/>
             <a:ext cx="1424846" cy="646331"/>
           </a:xfrm>
           <a:prstGeom prst="rect">
@@ -5114,7 +5113,7 @@
         </p:nvSpPr>
         <p:spPr>
           <a:xfrm>
-            <a:off x="5864137" y="6093523"/>
+            <a:off x="4340137" y="5552347"/>
             <a:ext cx="621216" cy="215444"/>
           </a:xfrm>
           <a:prstGeom prst="rect">
@@ -5156,7 +5155,7 @@
         </p:nvSpPr>
         <p:spPr>
           <a:xfrm>
-            <a:off x="2123983" y="6071888"/>
+            <a:off x="599983" y="5530712"/>
             <a:ext cx="762000" cy="215444"/>
           </a:xfrm>
           <a:prstGeom prst="rect">
@@ -5198,7 +5197,7 @@
         </p:nvSpPr>
         <p:spPr>
           <a:xfrm>
-            <a:off x="7386738" y="5837588"/>
+            <a:off x="5862738" y="5364992"/>
             <a:ext cx="1676400" cy="232379"/>
           </a:xfrm>
           <a:prstGeom prst="rect">
@@ -5240,16 +5239,7 @@
                 </a:solidFill>
                 <a:latin typeface="Calibri"/>
               </a:rPr>
-              <a:t>result:Command</a:t>
-            </a:r>
-            <a:r>
-              <a:rPr lang="en-US" sz="1200" dirty="0">
-                <a:solidFill>
-                  <a:prstClr val="white"/>
-                </a:solidFill>
-                <a:latin typeface="Calibri"/>
-              </a:rPr>
-              <a:t> Result</a:t>
+              <a:t>result:CommandResult</a:t>
             </a:r>
             <a:endParaRPr lang="en-SG" sz="1200" dirty="0">
               <a:solidFill>
@@ -5268,8 +5258,8 @@
         </p:nvSpPr>
         <p:spPr>
           <a:xfrm>
-            <a:off x="8148738" y="6078283"/>
-            <a:ext cx="152400" cy="171376"/>
+            <a:off x="6624738" y="5610087"/>
+            <a:ext cx="152400" cy="113636"/>
           </a:xfrm>
           <a:prstGeom prst="rect">
             <a:avLst/>
@@ -5322,7 +5312,7 @@
         </p:nvCxnSpPr>
         <p:spPr>
           <a:xfrm>
-            <a:off x="7237928" y="6260524"/>
+            <a:off x="5713928" y="5719348"/>
             <a:ext cx="910811" cy="0"/>
           </a:xfrm>
           <a:prstGeom prst="straightConnector1">
@@ -5360,7 +5350,7 @@
         </p:nvSpPr>
         <p:spPr>
           <a:xfrm>
-            <a:off x="4197846" y="3893978"/>
+            <a:off x="2673846" y="2688338"/>
             <a:ext cx="220343" cy="215444"/>
           </a:xfrm>
           <a:prstGeom prst="rect">
@@ -5402,7 +5392,7 @@
         </p:nvSpPr>
         <p:spPr>
           <a:xfrm>
-            <a:off x="5308400" y="1752601"/>
+            <a:off x="3784400" y="975205"/>
             <a:ext cx="1778201" cy="432035"/>
           </a:xfrm>
           <a:prstGeom prst="rect">
@@ -5492,8 +5482,8 @@
         </p:nvCxnSpPr>
         <p:spPr>
           <a:xfrm>
-            <a:off x="4967981" y="2539328"/>
-            <a:ext cx="1176315" cy="0"/>
+            <a:off x="3429001" y="1633916"/>
+            <a:ext cx="1191295" cy="0"/>
           </a:xfrm>
           <a:prstGeom prst="straightConnector1">
             <a:avLst/>
@@ -5526,7 +5516,7 @@
         </p:nvSpPr>
         <p:spPr>
           <a:xfrm>
-            <a:off x="6136242" y="2183423"/>
+            <a:off x="4612242" y="1406027"/>
             <a:ext cx="205843" cy="123165"/>
           </a:xfrm>
           <a:prstGeom prst="rect">
@@ -5580,8 +5570,8 @@
         </p:nvCxnSpPr>
         <p:spPr>
           <a:xfrm>
-            <a:off x="6239288" y="2175562"/>
-            <a:ext cx="3799" cy="2135303"/>
+            <a:off x="4715288" y="1408834"/>
+            <a:ext cx="0" cy="1657839"/>
           </a:xfrm>
           <a:prstGeom prst="line">
             <a:avLst/>
@@ -5617,8 +5607,8 @@
         </p:nvSpPr>
         <p:spPr>
           <a:xfrm>
-            <a:off x="6144592" y="2539330"/>
-            <a:ext cx="201395" cy="1575470"/>
+            <a:off x="4620592" y="1620202"/>
+            <a:ext cx="198331" cy="1290158"/>
           </a:xfrm>
           <a:prstGeom prst="rect">
             <a:avLst/>
@@ -5671,7 +5661,7 @@
         </p:nvCxnSpPr>
         <p:spPr>
           <a:xfrm>
-            <a:off x="4983520" y="4109061"/>
+            <a:off x="3459520" y="2903421"/>
             <a:ext cx="1165315" cy="1"/>
           </a:xfrm>
           <a:prstGeom prst="straightConnector1">
@@ -5711,7 +5701,7 @@
         </p:nvCxnSpPr>
         <p:spPr>
           <a:xfrm flipV="1">
-            <a:off x="4953001" y="2019751"/>
+            <a:off x="3429001" y="1242355"/>
             <a:ext cx="358137" cy="3411"/>
           </a:xfrm>
           <a:prstGeom prst="straightConnector1">
@@ -5749,8 +5739,8 @@
         </p:nvCxnSpPr>
         <p:spPr>
           <a:xfrm>
-            <a:off x="4983519" y="2298726"/>
-            <a:ext cx="1152846" cy="0"/>
+            <a:off x="3439965" y="1521330"/>
+            <a:ext cx="1172400" cy="0"/>
           </a:xfrm>
           <a:prstGeom prst="straightConnector1">
             <a:avLst/>
@@ -5787,7 +5777,7 @@
         </p:nvSpPr>
         <p:spPr>
           <a:xfrm>
-            <a:off x="6015902" y="4156741"/>
+            <a:off x="4500623" y="2916393"/>
             <a:ext cx="463460" cy="261610"/>
           </a:xfrm>
           <a:prstGeom prst="rect">
@@ -5827,7 +5817,7 @@
         </p:nvSpPr>
         <p:spPr>
           <a:xfrm>
-            <a:off x="6743907" y="2942828"/>
+            <a:off x="5219907" y="2165432"/>
             <a:ext cx="850026" cy="335501"/>
           </a:xfrm>
           <a:prstGeom prst="rect">
@@ -5906,8 +5896,8 @@
         </p:nvSpPr>
         <p:spPr>
           <a:xfrm>
-            <a:off x="7108920" y="3285313"/>
-            <a:ext cx="125330" cy="847461"/>
+            <a:off x="5584920" y="2591737"/>
+            <a:ext cx="100601" cy="318257"/>
           </a:xfrm>
           <a:prstGeom prst="rect">
             <a:avLst/>
@@ -5961,14 +5951,13 @@
           </p:cNvPr>
           <p:cNvCxnSpPr>
             <a:cxnSpLocks/>
-            <a:endCxn id="74" idx="1"/>
           </p:cNvCxnSpPr>
           <p:nvPr/>
         </p:nvCxnSpPr>
         <p:spPr>
-          <a:xfrm>
-            <a:off x="6369315" y="3108444"/>
-            <a:ext cx="374592" cy="2134"/>
+          <a:xfrm flipV="1">
+            <a:off x="4725418" y="2328883"/>
+            <a:ext cx="497670" cy="3325"/>
           </a:xfrm>
           <a:prstGeom prst="straightConnector1">
             <a:avLst/>
@@ -6009,7 +5998,7 @@
         </p:nvSpPr>
         <p:spPr>
           <a:xfrm>
-            <a:off x="6103945" y="3136520"/>
+            <a:off x="4426913" y="2319867"/>
             <a:ext cx="621216" cy="215444"/>
           </a:xfrm>
           <a:prstGeom prst="rect">
@@ -6060,8 +6049,8 @@
         </p:nvCxnSpPr>
         <p:spPr>
           <a:xfrm flipV="1">
-            <a:off x="7202960" y="5600700"/>
-            <a:ext cx="2267450" cy="13998"/>
+            <a:off x="5678960" y="5059524"/>
+            <a:ext cx="4129470" cy="22620"/>
           </a:xfrm>
           <a:prstGeom prst="straightConnector1">
             <a:avLst/>
@@ -6104,7 +6093,7 @@
         </p:nvCxnSpPr>
         <p:spPr>
           <a:xfrm>
-            <a:off x="6361669" y="4109060"/>
+            <a:off x="4837669" y="2903420"/>
             <a:ext cx="733069" cy="6940"/>
           </a:xfrm>
           <a:prstGeom prst="straightConnector1">
@@ -6148,7 +6137,7 @@
         </p:nvSpPr>
         <p:spPr>
           <a:xfrm>
-            <a:off x="8161050" y="4362517"/>
+            <a:off x="6637050" y="3089821"/>
             <a:ext cx="926621" cy="230693"/>
           </a:xfrm>
           <a:prstGeom prst="rect">
@@ -6190,7 +6179,7 @@
                 </a:solidFill>
                 <a:latin typeface="Calibri"/>
               </a:rPr>
-              <a:t>t:Person</a:t>
+              <a:t>t:Student</a:t>
             </a:r>
             <a:endParaRPr lang="en-SG" sz="1200" dirty="0">
               <a:solidFill>
@@ -6215,7 +6204,7 @@
         </p:nvSpPr>
         <p:spPr>
           <a:xfrm>
-            <a:off x="8529165" y="4593752"/>
+            <a:off x="7005165" y="3321056"/>
             <a:ext cx="144923" cy="102175"/>
           </a:xfrm>
           <a:prstGeom prst="rect">
@@ -6270,14 +6259,13 @@
           </p:cNvPr>
           <p:cNvCxnSpPr>
             <a:cxnSpLocks/>
-            <a:endCxn id="110" idx="1"/>
           </p:cNvCxnSpPr>
           <p:nvPr/>
         </p:nvCxnSpPr>
         <p:spPr>
           <a:xfrm>
-            <a:off x="7235979" y="4476947"/>
-            <a:ext cx="925070" cy="916"/>
+            <a:off x="5635220" y="3197778"/>
+            <a:ext cx="989518" cy="1090"/>
           </a:xfrm>
           <a:prstGeom prst="straightConnector1">
             <a:avLst/>
@@ -6318,7 +6306,7 @@
         </p:nvSpPr>
         <p:spPr>
           <a:xfrm>
-            <a:off x="6989880" y="4308655"/>
+            <a:off x="5465880" y="3035959"/>
             <a:ext cx="1150818" cy="107722"/>
           </a:xfrm>
           <a:prstGeom prst="rect">
@@ -6375,8 +6363,8 @@
         </p:nvCxnSpPr>
         <p:spPr>
           <a:xfrm>
-            <a:off x="7244116" y="4692004"/>
-            <a:ext cx="1357510" cy="3923"/>
+            <a:off x="5685521" y="3418323"/>
+            <a:ext cx="1392106" cy="4908"/>
           </a:xfrm>
           <a:prstGeom prst="straightConnector1">
             <a:avLst/>
@@ -6419,8 +6407,8 @@
         </p:nvSpPr>
         <p:spPr>
           <a:xfrm>
-            <a:off x="8548015" y="5077292"/>
-            <a:ext cx="135553" cy="327233"/>
+            <a:off x="7024015" y="4723781"/>
+            <a:ext cx="187553" cy="102797"/>
           </a:xfrm>
           <a:prstGeom prst="rect">
             <a:avLst/>
@@ -6479,9 +6467,9 @@
           <p:nvPr/>
         </p:nvCxnSpPr>
         <p:spPr>
-          <a:xfrm flipV="1">
-            <a:off x="7235979" y="4948093"/>
-            <a:ext cx="925070" cy="4908"/>
+          <a:xfrm>
+            <a:off x="5655463" y="4620278"/>
+            <a:ext cx="981587" cy="0"/>
           </a:xfrm>
           <a:prstGeom prst="straightConnector1">
             <a:avLst/>
@@ -6525,8 +6513,8 @@
         </p:nvCxnSpPr>
         <p:spPr>
           <a:xfrm>
-            <a:off x="7244117" y="5404524"/>
-            <a:ext cx="1371675" cy="0"/>
+            <a:off x="5667212" y="4826578"/>
+            <a:ext cx="1450580" cy="0"/>
           </a:xfrm>
           <a:prstGeom prst="straightConnector1">
             <a:avLst/>
@@ -6569,8 +6557,8 @@
         </p:nvSpPr>
         <p:spPr>
           <a:xfrm>
-            <a:off x="8161050" y="4832747"/>
-            <a:ext cx="926621" cy="230693"/>
+            <a:off x="6637050" y="4504931"/>
+            <a:ext cx="989046" cy="230693"/>
           </a:xfrm>
           <a:prstGeom prst="rect">
             <a:avLst/>
@@ -6611,7 +6599,7 @@
                 </a:solidFill>
                 <a:latin typeface="Calibri"/>
               </a:rPr>
-              <a:t>edited:Person</a:t>
+              <a:t>edited:Student</a:t>
             </a:r>
             <a:endParaRPr lang="en-SG" sz="1000" dirty="0">
               <a:solidFill>
@@ -6619,6 +6607,767 @@
               </a:solidFill>
               <a:latin typeface="Calibri"/>
             </a:endParaRPr>
+          </a:p>
+        </p:txBody>
+      </p:sp>
+      <p:cxnSp>
+        <p:nvCxnSpPr>
+          <p:cNvPr id="89" name="Straight Connector 88">
+            <a:extLst>
+              <a:ext uri="{FF2B5EF4-FFF2-40B4-BE49-F238E27FC236}">
+                <a16:creationId xmlns:a16="http://schemas.microsoft.com/office/drawing/2014/main" id="{3C52FF72-1AFF-4CFD-B58A-8AA853F51E06}"/>
+              </a:ext>
+            </a:extLst>
+          </p:cNvPr>
+          <p:cNvCxnSpPr>
+            <a:cxnSpLocks/>
+          </p:cNvCxnSpPr>
+          <p:nvPr/>
+        </p:nvCxnSpPr>
+        <p:spPr>
+          <a:xfrm>
+            <a:off x="7077627" y="3299962"/>
+            <a:ext cx="0" cy="728478"/>
+          </a:xfrm>
+          <a:prstGeom prst="line">
+            <a:avLst/>
+          </a:prstGeom>
+          <a:ln w="19050">
+            <a:solidFill>
+              <a:srgbClr val="0070C0"/>
+            </a:solidFill>
+            <a:prstDash val="sysDash"/>
+          </a:ln>
+          <a:effectLst/>
+        </p:spPr>
+        <p:style>
+          <a:lnRef idx="1">
+            <a:schemeClr val="accent1"/>
+          </a:lnRef>
+          <a:fillRef idx="2">
+            <a:schemeClr val="accent1"/>
+          </a:fillRef>
+          <a:effectRef idx="1">
+            <a:schemeClr val="accent1"/>
+          </a:effectRef>
+          <a:fontRef idx="minor">
+            <a:schemeClr val="dk1"/>
+          </a:fontRef>
+        </p:style>
+      </p:cxnSp>
+      <p:sp>
+        <p:nvSpPr>
+          <p:cNvPr id="91" name="Rectangle 90">
+            <a:extLst>
+              <a:ext uri="{FF2B5EF4-FFF2-40B4-BE49-F238E27FC236}">
+                <a16:creationId xmlns:a16="http://schemas.microsoft.com/office/drawing/2014/main" id="{27739D36-84D0-4EC7-99BB-3DC63996C25E}"/>
+              </a:ext>
+            </a:extLst>
+          </p:cNvPr>
+          <p:cNvSpPr/>
+          <p:nvPr/>
+        </p:nvSpPr>
+        <p:spPr>
+          <a:xfrm>
+            <a:off x="7014536" y="3533248"/>
+            <a:ext cx="124308" cy="402673"/>
+          </a:xfrm>
+          <a:prstGeom prst="rect">
+            <a:avLst/>
+          </a:prstGeom>
+          <a:solidFill>
+            <a:srgbClr val="0070C0"/>
+          </a:solidFill>
+          <a:ln>
+            <a:solidFill>
+              <a:srgbClr val="0070C0"/>
+            </a:solidFill>
+          </a:ln>
+          <a:effectLst/>
+        </p:spPr>
+        <p:style>
+          <a:lnRef idx="1">
+            <a:schemeClr val="accent3"/>
+          </a:lnRef>
+          <a:fillRef idx="2">
+            <a:schemeClr val="accent3"/>
+          </a:fillRef>
+          <a:effectRef idx="1">
+            <a:schemeClr val="accent3"/>
+          </a:effectRef>
+          <a:fontRef idx="minor">
+            <a:schemeClr val="dk1"/>
+          </a:fontRef>
+        </p:style>
+        <p:txBody>
+          <a:bodyPr rtlCol="0" anchor="ctr"/>
+          <a:lstStyle/>
+          <a:p>
+            <a:pPr algn="ctr"/>
+            <a:endParaRPr lang="en-SG" sz="1400">
+              <a:solidFill>
+                <a:prstClr val="black"/>
+              </a:solidFill>
+              <a:latin typeface="Calibri"/>
+            </a:endParaRPr>
+          </a:p>
+        </p:txBody>
+      </p:sp>
+      <p:cxnSp>
+        <p:nvCxnSpPr>
+          <p:cNvPr id="94" name="Straight Arrow Connector 93">
+            <a:extLst>
+              <a:ext uri="{FF2B5EF4-FFF2-40B4-BE49-F238E27FC236}">
+                <a16:creationId xmlns:a16="http://schemas.microsoft.com/office/drawing/2014/main" id="{42384EDF-EAEC-4D9B-B300-246D17B69F64}"/>
+              </a:ext>
+            </a:extLst>
+          </p:cNvPr>
+          <p:cNvCxnSpPr>
+            <a:cxnSpLocks/>
+          </p:cNvCxnSpPr>
+          <p:nvPr/>
+        </p:nvCxnSpPr>
+        <p:spPr>
+          <a:xfrm>
+            <a:off x="5673586" y="3925537"/>
+            <a:ext cx="1392106" cy="4908"/>
+          </a:xfrm>
+          <a:prstGeom prst="straightConnector1">
+            <a:avLst/>
+          </a:prstGeom>
+          <a:ln w="19050">
+            <a:solidFill>
+              <a:srgbClr val="0070C0"/>
+            </a:solidFill>
+            <a:prstDash val="sysDash"/>
+            <a:headEnd type="arrow" w="med" len="med"/>
+            <a:tailEnd type="none" w="med" len="med"/>
+          </a:ln>
+        </p:spPr>
+        <p:style>
+          <a:lnRef idx="1">
+            <a:schemeClr val="accent1"/>
+          </a:lnRef>
+          <a:fillRef idx="0">
+            <a:schemeClr val="accent1"/>
+          </a:fillRef>
+          <a:effectRef idx="0">
+            <a:schemeClr val="accent1"/>
+          </a:effectRef>
+          <a:fontRef idx="minor">
+            <a:schemeClr val="tx1"/>
+          </a:fontRef>
+        </p:style>
+      </p:cxnSp>
+      <p:cxnSp>
+        <p:nvCxnSpPr>
+          <p:cNvPr id="96" name="Straight Arrow Connector 95">
+            <a:extLst>
+              <a:ext uri="{FF2B5EF4-FFF2-40B4-BE49-F238E27FC236}">
+                <a16:creationId xmlns:a16="http://schemas.microsoft.com/office/drawing/2014/main" id="{5C148ACD-B02E-4E4C-A941-E725C5C105DF}"/>
+              </a:ext>
+            </a:extLst>
+          </p:cNvPr>
+          <p:cNvCxnSpPr>
+            <a:cxnSpLocks/>
+          </p:cNvCxnSpPr>
+          <p:nvPr/>
+        </p:nvCxnSpPr>
+        <p:spPr>
+          <a:xfrm>
+            <a:off x="7140720" y="3602424"/>
+            <a:ext cx="591040" cy="141"/>
+          </a:xfrm>
+          <a:prstGeom prst="straightConnector1">
+            <a:avLst/>
+          </a:prstGeom>
+          <a:ln w="19050">
+            <a:solidFill>
+              <a:srgbClr val="0070C0"/>
+            </a:solidFill>
+            <a:tailEnd type="arrow"/>
+          </a:ln>
+        </p:spPr>
+        <p:style>
+          <a:lnRef idx="1">
+            <a:schemeClr val="accent1"/>
+          </a:lnRef>
+          <a:fillRef idx="0">
+            <a:schemeClr val="accent1"/>
+          </a:fillRef>
+          <a:effectRef idx="0">
+            <a:schemeClr val="accent1"/>
+          </a:effectRef>
+          <a:fontRef idx="minor">
+            <a:schemeClr val="tx1"/>
+          </a:fontRef>
+        </p:style>
+      </p:cxnSp>
+      <p:cxnSp>
+        <p:nvCxnSpPr>
+          <p:cNvPr id="97" name="Straight Arrow Connector 96">
+            <a:extLst>
+              <a:ext uri="{FF2B5EF4-FFF2-40B4-BE49-F238E27FC236}">
+                <a16:creationId xmlns:a16="http://schemas.microsoft.com/office/drawing/2014/main" id="{19ADF5F6-152B-4A86-9E88-3F66FD422235}"/>
+              </a:ext>
+            </a:extLst>
+          </p:cNvPr>
+          <p:cNvCxnSpPr>
+            <a:cxnSpLocks/>
+          </p:cNvCxnSpPr>
+          <p:nvPr/>
+        </p:nvCxnSpPr>
+        <p:spPr>
+          <a:xfrm>
+            <a:off x="7138843" y="3820487"/>
+            <a:ext cx="972781" cy="0"/>
+          </a:xfrm>
+          <a:prstGeom prst="straightConnector1">
+            <a:avLst/>
+          </a:prstGeom>
+          <a:ln w="19050">
+            <a:solidFill>
+              <a:srgbClr val="0070C0"/>
+            </a:solidFill>
+            <a:prstDash val="sysDash"/>
+            <a:headEnd type="arrow" w="med" len="med"/>
+            <a:tailEnd type="none" w="med" len="med"/>
+          </a:ln>
+        </p:spPr>
+        <p:style>
+          <a:lnRef idx="1">
+            <a:schemeClr val="accent1"/>
+          </a:lnRef>
+          <a:fillRef idx="0">
+            <a:schemeClr val="accent1"/>
+          </a:fillRef>
+          <a:effectRef idx="0">
+            <a:schemeClr val="accent1"/>
+          </a:effectRef>
+          <a:fontRef idx="minor">
+            <a:schemeClr val="tx1"/>
+          </a:fontRef>
+        </p:style>
+      </p:cxnSp>
+      <p:sp>
+        <p:nvSpPr>
+          <p:cNvPr id="98" name="TextBox 97">
+            <a:extLst>
+              <a:ext uri="{FF2B5EF4-FFF2-40B4-BE49-F238E27FC236}">
+                <a16:creationId xmlns:a16="http://schemas.microsoft.com/office/drawing/2014/main" id="{6BF14BD3-52B4-486D-8DBE-D7B6178D4C1A}"/>
+              </a:ext>
+            </a:extLst>
+          </p:cNvPr>
+          <p:cNvSpPr txBox="1"/>
+          <p:nvPr/>
+        </p:nvSpPr>
+        <p:spPr>
+          <a:xfrm>
+            <a:off x="6584159" y="3435937"/>
+            <a:ext cx="1150818" cy="107722"/>
+          </a:xfrm>
+          <a:prstGeom prst="rect">
+            <a:avLst/>
+          </a:prstGeom>
+          <a:noFill/>
+        </p:spPr>
+        <p:txBody>
+          <a:bodyPr wrap="square" lIns="0" tIns="0" rIns="0" bIns="0" rtlCol="0">
+            <a:spAutoFit/>
+          </a:bodyPr>
+          <a:lstStyle>
+            <a:defPPr>
+              <a:defRPr lang="en-US"/>
+            </a:defPPr>
+            <a:lvl1pPr algn="r">
+              <a:defRPr sz="1400">
+                <a:solidFill>
+                  <a:srgbClr val="0070C0"/>
+                </a:solidFill>
+              </a:defRPr>
+            </a:lvl1pPr>
+          </a:lstStyle>
+          <a:p>
+            <a:r>
+              <a:rPr lang="en-US" sz="700" dirty="0" err="1">
+                <a:latin typeface="Calibri"/>
+              </a:rPr>
+              <a:t>getPayments</a:t>
+            </a:r>
+            <a:r>
+              <a:rPr lang="en-US" sz="700" dirty="0">
+                <a:latin typeface="Calibri"/>
+              </a:rPr>
+              <a:t>()</a:t>
+            </a:r>
+          </a:p>
+        </p:txBody>
+      </p:sp>
+      <p:sp>
+        <p:nvSpPr>
+          <p:cNvPr id="99" name="Rectangle 62">
+            <a:extLst>
+              <a:ext uri="{FF2B5EF4-FFF2-40B4-BE49-F238E27FC236}">
+                <a16:creationId xmlns:a16="http://schemas.microsoft.com/office/drawing/2014/main" id="{FBE52BE1-83B1-4044-832A-21CFA28B823E}"/>
+              </a:ext>
+            </a:extLst>
+          </p:cNvPr>
+          <p:cNvSpPr/>
+          <p:nvPr/>
+        </p:nvSpPr>
+        <p:spPr>
+          <a:xfrm>
+            <a:off x="7743509" y="3487077"/>
+            <a:ext cx="926621" cy="230693"/>
+          </a:xfrm>
+          <a:prstGeom prst="rect">
+            <a:avLst/>
+          </a:prstGeom>
+          <a:solidFill>
+            <a:srgbClr val="0070C0"/>
+          </a:solidFill>
+          <a:ln w="19050">
+            <a:solidFill>
+              <a:srgbClr val="0070C0"/>
+            </a:solidFill>
+          </a:ln>
+          <a:effectLst/>
+        </p:spPr>
+        <p:style>
+          <a:lnRef idx="1">
+            <a:schemeClr val="accent2"/>
+          </a:lnRef>
+          <a:fillRef idx="2">
+            <a:schemeClr val="accent2"/>
+          </a:fillRef>
+          <a:effectRef idx="1">
+            <a:schemeClr val="accent2"/>
+          </a:effectRef>
+          <a:fontRef idx="minor">
+            <a:schemeClr val="dk1"/>
+          </a:fontRef>
+        </p:style>
+        <p:txBody>
+          <a:bodyPr rtlCol="0" anchor="ctr"/>
+          <a:lstStyle/>
+          <a:p>
+            <a:pPr algn="ctr"/>
+            <a:r>
+              <a:rPr lang="en-US" sz="800" dirty="0">
+                <a:solidFill>
+                  <a:prstClr val="white"/>
+                </a:solidFill>
+                <a:latin typeface="Calibri"/>
+              </a:rPr>
+              <a:t>l:List&lt;Payments&gt;</a:t>
+            </a:r>
+            <a:endParaRPr lang="en-SG" sz="800" dirty="0">
+              <a:solidFill>
+                <a:prstClr val="white"/>
+              </a:solidFill>
+              <a:latin typeface="Calibri"/>
+            </a:endParaRPr>
+          </a:p>
+        </p:txBody>
+      </p:sp>
+      <p:sp>
+        <p:nvSpPr>
+          <p:cNvPr id="100" name="Rectangle 99">
+            <a:extLst>
+              <a:ext uri="{FF2B5EF4-FFF2-40B4-BE49-F238E27FC236}">
+                <a16:creationId xmlns:a16="http://schemas.microsoft.com/office/drawing/2014/main" id="{D229B755-5805-4A80-91B2-FEDEE15C495C}"/>
+              </a:ext>
+            </a:extLst>
+          </p:cNvPr>
+          <p:cNvSpPr/>
+          <p:nvPr/>
+        </p:nvSpPr>
+        <p:spPr>
+          <a:xfrm>
+            <a:off x="8111624" y="3718312"/>
+            <a:ext cx="144923" cy="102175"/>
+          </a:xfrm>
+          <a:prstGeom prst="rect">
+            <a:avLst/>
+          </a:prstGeom>
+          <a:solidFill>
+            <a:srgbClr val="0070C0"/>
+          </a:solidFill>
+          <a:ln>
+            <a:solidFill>
+              <a:srgbClr val="0070C0"/>
+            </a:solidFill>
+          </a:ln>
+          <a:effectLst/>
+        </p:spPr>
+        <p:style>
+          <a:lnRef idx="1">
+            <a:schemeClr val="accent3"/>
+          </a:lnRef>
+          <a:fillRef idx="2">
+            <a:schemeClr val="accent3"/>
+          </a:fillRef>
+          <a:effectRef idx="1">
+            <a:schemeClr val="accent3"/>
+          </a:effectRef>
+          <a:fontRef idx="minor">
+            <a:schemeClr val="dk1"/>
+          </a:fontRef>
+        </p:style>
+        <p:txBody>
+          <a:bodyPr rtlCol="0" anchor="ctr"/>
+          <a:lstStyle/>
+          <a:p>
+            <a:pPr algn="ctr"/>
+            <a:endParaRPr lang="en-SG" sz="1400">
+              <a:solidFill>
+                <a:prstClr val="black"/>
+              </a:solidFill>
+              <a:latin typeface="Calibri"/>
+            </a:endParaRPr>
+          </a:p>
+        </p:txBody>
+      </p:sp>
+      <p:sp>
+        <p:nvSpPr>
+          <p:cNvPr id="101" name="TextBox 100">
+            <a:extLst>
+              <a:ext uri="{FF2B5EF4-FFF2-40B4-BE49-F238E27FC236}">
+                <a16:creationId xmlns:a16="http://schemas.microsoft.com/office/drawing/2014/main" id="{4FFDA7D7-5B61-4979-83C4-DE0F52D01109}"/>
+              </a:ext>
+            </a:extLst>
+          </p:cNvPr>
+          <p:cNvSpPr txBox="1"/>
+          <p:nvPr/>
+        </p:nvSpPr>
+        <p:spPr>
+          <a:xfrm>
+            <a:off x="6197815" y="3712105"/>
+            <a:ext cx="220343" cy="215444"/>
+          </a:xfrm>
+          <a:prstGeom prst="rect">
+            <a:avLst/>
+          </a:prstGeom>
+          <a:noFill/>
+        </p:spPr>
+        <p:txBody>
+          <a:bodyPr wrap="square" lIns="0" tIns="0" rIns="0" bIns="0" rtlCol="0">
+            <a:spAutoFit/>
+          </a:bodyPr>
+          <a:lstStyle>
+            <a:defPPr>
+              <a:defRPr lang="en-US"/>
+            </a:defPPr>
+            <a:lvl1pPr algn="r">
+              <a:defRPr sz="1400">
+                <a:solidFill>
+                  <a:srgbClr val="0070C0"/>
+                </a:solidFill>
+              </a:defRPr>
+            </a:lvl1pPr>
+          </a:lstStyle>
+          <a:p>
+            <a:r>
+              <a:rPr lang="en-US" dirty="0">
+                <a:latin typeface="Calibri"/>
+              </a:rPr>
+              <a:t>l</a:t>
+            </a:r>
+          </a:p>
+        </p:txBody>
+      </p:sp>
+      <p:cxnSp>
+        <p:nvCxnSpPr>
+          <p:cNvPr id="102" name="Straight Connector 101">
+            <a:extLst>
+              <a:ext uri="{FF2B5EF4-FFF2-40B4-BE49-F238E27FC236}">
+                <a16:creationId xmlns:a16="http://schemas.microsoft.com/office/drawing/2014/main" id="{347EB980-93F3-4661-BFCE-7572AC377838}"/>
+              </a:ext>
+            </a:extLst>
+          </p:cNvPr>
+          <p:cNvCxnSpPr>
+            <a:cxnSpLocks/>
+          </p:cNvCxnSpPr>
+          <p:nvPr/>
+        </p:nvCxnSpPr>
+        <p:spPr>
+          <a:xfrm>
+            <a:off x="8180668" y="3640396"/>
+            <a:ext cx="0" cy="723324"/>
+          </a:xfrm>
+          <a:prstGeom prst="line">
+            <a:avLst/>
+          </a:prstGeom>
+          <a:ln w="19050">
+            <a:solidFill>
+              <a:srgbClr val="0070C0"/>
+            </a:solidFill>
+            <a:prstDash val="sysDash"/>
+          </a:ln>
+          <a:effectLst/>
+        </p:spPr>
+        <p:style>
+          <a:lnRef idx="1">
+            <a:schemeClr val="accent1"/>
+          </a:lnRef>
+          <a:fillRef idx="2">
+            <a:schemeClr val="accent1"/>
+          </a:fillRef>
+          <a:effectRef idx="1">
+            <a:schemeClr val="accent1"/>
+          </a:effectRef>
+          <a:fontRef idx="minor">
+            <a:schemeClr val="dk1"/>
+          </a:fontRef>
+        </p:style>
+      </p:cxnSp>
+      <p:sp>
+        <p:nvSpPr>
+          <p:cNvPr id="103" name="Rectangle 102">
+            <a:extLst>
+              <a:ext uri="{FF2B5EF4-FFF2-40B4-BE49-F238E27FC236}">
+                <a16:creationId xmlns:a16="http://schemas.microsoft.com/office/drawing/2014/main" id="{A13B574E-3DBC-4EE8-ACDD-D66B11DFF994}"/>
+              </a:ext>
+            </a:extLst>
+          </p:cNvPr>
+          <p:cNvSpPr/>
+          <p:nvPr/>
+        </p:nvSpPr>
+        <p:spPr>
+          <a:xfrm>
+            <a:off x="8117578" y="4097316"/>
+            <a:ext cx="138942" cy="266402"/>
+          </a:xfrm>
+          <a:prstGeom prst="rect">
+            <a:avLst/>
+          </a:prstGeom>
+          <a:solidFill>
+            <a:srgbClr val="0070C0"/>
+          </a:solidFill>
+          <a:ln>
+            <a:solidFill>
+              <a:srgbClr val="0070C0"/>
+            </a:solidFill>
+          </a:ln>
+          <a:effectLst/>
+        </p:spPr>
+        <p:style>
+          <a:lnRef idx="1">
+            <a:schemeClr val="accent3"/>
+          </a:lnRef>
+          <a:fillRef idx="2">
+            <a:schemeClr val="accent3"/>
+          </a:fillRef>
+          <a:effectRef idx="1">
+            <a:schemeClr val="accent3"/>
+          </a:effectRef>
+          <a:fontRef idx="minor">
+            <a:schemeClr val="dk1"/>
+          </a:fontRef>
+        </p:style>
+        <p:txBody>
+          <a:bodyPr rtlCol="0" anchor="ctr"/>
+          <a:lstStyle/>
+          <a:p>
+            <a:pPr algn="ctr"/>
+            <a:endParaRPr lang="en-SG" sz="1400">
+              <a:solidFill>
+                <a:prstClr val="black"/>
+              </a:solidFill>
+              <a:latin typeface="Calibri"/>
+            </a:endParaRPr>
+          </a:p>
+        </p:txBody>
+      </p:sp>
+      <p:cxnSp>
+        <p:nvCxnSpPr>
+          <p:cNvPr id="107" name="Straight Arrow Connector 106">
+            <a:extLst>
+              <a:ext uri="{FF2B5EF4-FFF2-40B4-BE49-F238E27FC236}">
+                <a16:creationId xmlns:a16="http://schemas.microsoft.com/office/drawing/2014/main" id="{4E152355-9291-4494-9655-286C83458D28}"/>
+              </a:ext>
+            </a:extLst>
+          </p:cNvPr>
+          <p:cNvCxnSpPr>
+            <a:cxnSpLocks/>
+          </p:cNvCxnSpPr>
+          <p:nvPr/>
+        </p:nvCxnSpPr>
+        <p:spPr>
+          <a:xfrm>
+            <a:off x="5689976" y="4097316"/>
+            <a:ext cx="2421648" cy="0"/>
+          </a:xfrm>
+          <a:prstGeom prst="straightConnector1">
+            <a:avLst/>
+          </a:prstGeom>
+          <a:ln w="19050">
+            <a:solidFill>
+              <a:srgbClr val="0070C0"/>
+            </a:solidFill>
+            <a:tailEnd type="arrow"/>
+          </a:ln>
+        </p:spPr>
+        <p:style>
+          <a:lnRef idx="1">
+            <a:schemeClr val="accent1"/>
+          </a:lnRef>
+          <a:fillRef idx="0">
+            <a:schemeClr val="accent1"/>
+          </a:fillRef>
+          <a:effectRef idx="0">
+            <a:schemeClr val="accent1"/>
+          </a:effectRef>
+          <a:fontRef idx="minor">
+            <a:schemeClr val="tx1"/>
+          </a:fontRef>
+        </p:style>
+      </p:cxnSp>
+      <p:sp>
+        <p:nvSpPr>
+          <p:cNvPr id="114" name="TextBox 113">
+            <a:extLst>
+              <a:ext uri="{FF2B5EF4-FFF2-40B4-BE49-F238E27FC236}">
+                <a16:creationId xmlns:a16="http://schemas.microsoft.com/office/drawing/2014/main" id="{CED1B44B-EFE6-42B0-8D8B-B466893BD71D}"/>
+              </a:ext>
+            </a:extLst>
+          </p:cNvPr>
+          <p:cNvSpPr txBox="1"/>
+          <p:nvPr/>
+        </p:nvSpPr>
+        <p:spPr>
+          <a:xfrm>
+            <a:off x="6821720" y="3966195"/>
+            <a:ext cx="1150818" cy="107722"/>
+          </a:xfrm>
+          <a:prstGeom prst="rect">
+            <a:avLst/>
+          </a:prstGeom>
+          <a:noFill/>
+        </p:spPr>
+        <p:txBody>
+          <a:bodyPr wrap="square" lIns="0" tIns="0" rIns="0" bIns="0" rtlCol="0">
+            <a:spAutoFit/>
+          </a:bodyPr>
+          <a:lstStyle>
+            <a:defPPr>
+              <a:defRPr lang="en-US"/>
+            </a:defPPr>
+            <a:lvl1pPr algn="r">
+              <a:defRPr sz="1400">
+                <a:solidFill>
+                  <a:srgbClr val="0070C0"/>
+                </a:solidFill>
+              </a:defRPr>
+            </a:lvl1pPr>
+          </a:lstStyle>
+          <a:p>
+            <a:r>
+              <a:rPr lang="en-US" sz="700" dirty="0" err="1">
+                <a:latin typeface="Calibri"/>
+              </a:rPr>
+              <a:t>updatePayments</a:t>
+            </a:r>
+            <a:r>
+              <a:rPr lang="en-US" sz="700" dirty="0">
+                <a:latin typeface="Calibri"/>
+              </a:rPr>
+              <a:t>(l, p)</a:t>
+            </a:r>
+          </a:p>
+        </p:txBody>
+      </p:sp>
+      <p:cxnSp>
+        <p:nvCxnSpPr>
+          <p:cNvPr id="115" name="Straight Arrow Connector 114">
+            <a:extLst>
+              <a:ext uri="{FF2B5EF4-FFF2-40B4-BE49-F238E27FC236}">
+                <a16:creationId xmlns:a16="http://schemas.microsoft.com/office/drawing/2014/main" id="{2639CACC-CC7D-4331-AA72-1D1467FB44F6}"/>
+              </a:ext>
+            </a:extLst>
+          </p:cNvPr>
+          <p:cNvCxnSpPr>
+            <a:cxnSpLocks/>
+          </p:cNvCxnSpPr>
+          <p:nvPr/>
+        </p:nvCxnSpPr>
+        <p:spPr>
+          <a:xfrm>
+            <a:off x="5655463" y="4363718"/>
+            <a:ext cx="2456160" cy="0"/>
+          </a:xfrm>
+          <a:prstGeom prst="straightConnector1">
+            <a:avLst/>
+          </a:prstGeom>
+          <a:ln w="19050">
+            <a:solidFill>
+              <a:srgbClr val="0070C0"/>
+            </a:solidFill>
+            <a:prstDash val="sysDash"/>
+            <a:headEnd type="arrow" w="med" len="med"/>
+            <a:tailEnd type="none" w="med" len="med"/>
+          </a:ln>
+        </p:spPr>
+        <p:style>
+          <a:lnRef idx="1">
+            <a:schemeClr val="accent1"/>
+          </a:lnRef>
+          <a:fillRef idx="0">
+            <a:schemeClr val="accent1"/>
+          </a:fillRef>
+          <a:effectRef idx="0">
+            <a:schemeClr val="accent1"/>
+          </a:effectRef>
+          <a:fontRef idx="minor">
+            <a:schemeClr val="tx1"/>
+          </a:fontRef>
+        </p:style>
+      </p:cxnSp>
+      <p:sp>
+        <p:nvSpPr>
+          <p:cNvPr id="118" name="TextBox 117">
+            <a:extLst>
+              <a:ext uri="{FF2B5EF4-FFF2-40B4-BE49-F238E27FC236}">
+                <a16:creationId xmlns:a16="http://schemas.microsoft.com/office/drawing/2014/main" id="{B1018812-7701-4C64-9079-4B7D21DAB831}"/>
+              </a:ext>
+            </a:extLst>
+          </p:cNvPr>
+          <p:cNvSpPr txBox="1"/>
+          <p:nvPr/>
+        </p:nvSpPr>
+        <p:spPr>
+          <a:xfrm>
+            <a:off x="5956475" y="4421462"/>
+            <a:ext cx="220343" cy="215444"/>
+          </a:xfrm>
+          <a:prstGeom prst="rect">
+            <a:avLst/>
+          </a:prstGeom>
+          <a:noFill/>
+        </p:spPr>
+        <p:txBody>
+          <a:bodyPr wrap="square" lIns="0" tIns="0" rIns="0" bIns="0" rtlCol="0">
+            <a:spAutoFit/>
+          </a:bodyPr>
+          <a:lstStyle>
+            <a:defPPr>
+              <a:defRPr lang="en-US"/>
+            </a:defPPr>
+            <a:lvl1pPr algn="r">
+              <a:defRPr sz="1400">
+                <a:solidFill>
+                  <a:srgbClr val="0070C0"/>
+                </a:solidFill>
+              </a:defRPr>
+            </a:lvl1pPr>
+          </a:lstStyle>
+          <a:p>
+            <a:r>
+              <a:rPr lang="en-US" dirty="0">
+                <a:latin typeface="Calibri"/>
+              </a:rPr>
+              <a:t>l</a:t>
+            </a:r>
           </a:p>
         </p:txBody>
       </p:sp>

</xml_diff>

<commit_message>
Revert "Merge branch 'master' into master"
This reverts commit c435219f316932b419c1289946d2dbc89cc99836.
</commit_message>
<xml_diff>
--- a/docs/diagrams/EditPaymentSequenceDiagram.pptx
+++ b/docs/diagrams/EditPaymentSequenceDiagram.pptx
@@ -197,7 +197,7 @@
           <a:p>
             <a:fld id="{62511F6D-3957-4073-A6EA-8AA084D57D2E}" type="datetimeFigureOut">
               <a:rPr lang="en-US" smtClean="0"/>
-              <a:t>11/10/2018</a:t>
+              <a:t>10/23/2018</a:t>
             </a:fld>
             <a:endParaRPr lang="en-US"/>
           </a:p>
@@ -795,7 +795,7 @@
           <a:p>
             <a:fld id="{78C97017-6FC3-485B-9764-EAC9E56C1D49}" type="datetimeFigureOut">
               <a:rPr lang="en-US" smtClean="0"/>
-              <a:t>11/10/2018</a:t>
+              <a:t>10/23/2018</a:t>
             </a:fld>
             <a:endParaRPr lang="en-US"/>
           </a:p>
@@ -963,7 +963,7 @@
           <a:p>
             <a:fld id="{78C97017-6FC3-485B-9764-EAC9E56C1D49}" type="datetimeFigureOut">
               <a:rPr lang="en-US" smtClean="0"/>
-              <a:t>11/10/2018</a:t>
+              <a:t>10/23/2018</a:t>
             </a:fld>
             <a:endParaRPr lang="en-US"/>
           </a:p>
@@ -1141,7 +1141,7 @@
           <a:p>
             <a:fld id="{78C97017-6FC3-485B-9764-EAC9E56C1D49}" type="datetimeFigureOut">
               <a:rPr lang="en-US" smtClean="0"/>
-              <a:t>11/10/2018</a:t>
+              <a:t>10/23/2018</a:t>
             </a:fld>
             <a:endParaRPr lang="en-US"/>
           </a:p>
@@ -1309,7 +1309,7 @@
           <a:p>
             <a:fld id="{78C97017-6FC3-485B-9764-EAC9E56C1D49}" type="datetimeFigureOut">
               <a:rPr lang="en-US" smtClean="0"/>
-              <a:t>11/10/2018</a:t>
+              <a:t>10/23/2018</a:t>
             </a:fld>
             <a:endParaRPr lang="en-US"/>
           </a:p>
@@ -1554,7 +1554,7 @@
           <a:p>
             <a:fld id="{78C97017-6FC3-485B-9764-EAC9E56C1D49}" type="datetimeFigureOut">
               <a:rPr lang="en-US" smtClean="0"/>
-              <a:t>11/10/2018</a:t>
+              <a:t>10/23/2018</a:t>
             </a:fld>
             <a:endParaRPr lang="en-US"/>
           </a:p>
@@ -1839,7 +1839,7 @@
           <a:p>
             <a:fld id="{78C97017-6FC3-485B-9764-EAC9E56C1D49}" type="datetimeFigureOut">
               <a:rPr lang="en-US" smtClean="0"/>
-              <a:t>11/10/2018</a:t>
+              <a:t>10/23/2018</a:t>
             </a:fld>
             <a:endParaRPr lang="en-US"/>
           </a:p>
@@ -2258,7 +2258,7 @@
           <a:p>
             <a:fld id="{78C97017-6FC3-485B-9764-EAC9E56C1D49}" type="datetimeFigureOut">
               <a:rPr lang="en-US" smtClean="0"/>
-              <a:t>11/10/2018</a:t>
+              <a:t>10/23/2018</a:t>
             </a:fld>
             <a:endParaRPr lang="en-US"/>
           </a:p>
@@ -2375,7 +2375,7 @@
           <a:p>
             <a:fld id="{78C97017-6FC3-485B-9764-EAC9E56C1D49}" type="datetimeFigureOut">
               <a:rPr lang="en-US" smtClean="0"/>
-              <a:t>11/10/2018</a:t>
+              <a:t>10/23/2018</a:t>
             </a:fld>
             <a:endParaRPr lang="en-US"/>
           </a:p>
@@ -2470,7 +2470,7 @@
           <a:p>
             <a:fld id="{78C97017-6FC3-485B-9764-EAC9E56C1D49}" type="datetimeFigureOut">
               <a:rPr lang="en-US" smtClean="0"/>
-              <a:t>11/10/2018</a:t>
+              <a:t>10/23/2018</a:t>
             </a:fld>
             <a:endParaRPr lang="en-US"/>
           </a:p>
@@ -2745,7 +2745,7 @@
           <a:p>
             <a:fld id="{78C97017-6FC3-485B-9764-EAC9E56C1D49}" type="datetimeFigureOut">
               <a:rPr lang="en-US" smtClean="0"/>
-              <a:t>11/10/2018</a:t>
+              <a:t>10/23/2018</a:t>
             </a:fld>
             <a:endParaRPr lang="en-US"/>
           </a:p>
@@ -2997,7 +2997,7 @@
           <a:p>
             <a:fld id="{78C97017-6FC3-485B-9764-EAC9E56C1D49}" type="datetimeFigureOut">
               <a:rPr lang="en-US" smtClean="0"/>
-              <a:t>11/10/2018</a:t>
+              <a:t>10/23/2018</a:t>
             </a:fld>
             <a:endParaRPr lang="en-US"/>
           </a:p>
@@ -3208,7 +3208,7 @@
           <a:p>
             <a:fld id="{78C97017-6FC3-485B-9764-EAC9E56C1D49}" type="datetimeFigureOut">
               <a:rPr lang="en-US" smtClean="0"/>
-              <a:t>11/10/2018</a:t>
+              <a:t>10/23/2018</a:t>
             </a:fld>
             <a:endParaRPr lang="en-US"/>
           </a:p>
@@ -3597,8 +3597,8 @@
         </p:nvSpPr>
         <p:spPr>
           <a:xfrm>
-            <a:off x="9513560" y="137181"/>
-            <a:ext cx="1357863" cy="6029200"/>
+            <a:off x="9208697" y="851007"/>
+            <a:ext cx="1357863" cy="5859923"/>
           </a:xfrm>
           <a:prstGeom prst="roundRect">
             <a:avLst>
@@ -3657,8 +3657,8 @@
         </p:nvSpPr>
         <p:spPr>
           <a:xfrm>
-            <a:off x="611732" y="137181"/>
-            <a:ext cx="8837067" cy="6029200"/>
+            <a:off x="2135733" y="847633"/>
+            <a:ext cx="7012450" cy="5859923"/>
           </a:xfrm>
           <a:prstGeom prst="roundRect">
             <a:avLst>
@@ -3720,7 +3720,7 @@
         </p:nvSpPr>
         <p:spPr>
           <a:xfrm>
-            <a:off x="845046" y="482841"/>
+            <a:off x="2369046" y="1260237"/>
             <a:ext cx="1455629" cy="346760"/>
           </a:xfrm>
           <a:prstGeom prst="rect">
@@ -3793,7 +3793,7 @@
         </p:nvCxnSpPr>
         <p:spPr>
           <a:xfrm>
-            <a:off x="1572860" y="829602"/>
+            <a:off x="3096860" y="1606998"/>
             <a:ext cx="0" cy="3650803"/>
           </a:xfrm>
           <a:prstGeom prst="line">
@@ -3830,8 +3830,8 @@
         </p:nvSpPr>
         <p:spPr>
           <a:xfrm>
-            <a:off x="1500850" y="912164"/>
-            <a:ext cx="133093" cy="5165899"/>
+            <a:off x="3024850" y="1600201"/>
+            <a:ext cx="121416" cy="4860666"/>
           </a:xfrm>
           <a:prstGeom prst="rect">
             <a:avLst/>
@@ -3882,8 +3882,8 @@
         </p:nvSpPr>
         <p:spPr>
           <a:xfrm>
-            <a:off x="2697186" y="357729"/>
-            <a:ext cx="1278289" cy="467684"/>
+            <a:off x="4267200" y="1143000"/>
+            <a:ext cx="1219200" cy="467684"/>
           </a:xfrm>
           <a:prstGeom prst="rect">
             <a:avLst/>
@@ -3924,8 +3924,11 @@
                 </a:solidFill>
                 <a:latin typeface="Calibri"/>
               </a:rPr>
-              <a:t>:</a:t>
-            </a:r>
+              <a:t>:Address</a:t>
+            </a:r>
+          </a:p>
+          <a:p>
+            <a:pPr algn="ctr"/>
             <a:r>
               <a:rPr lang="en-US" sz="1600" dirty="0" err="1">
                 <a:solidFill>
@@ -3933,7 +3936,7 @@
                 </a:solidFill>
                 <a:latin typeface="Calibri"/>
               </a:rPr>
-              <a:t>TutorHelperParser</a:t>
+              <a:t>BookParser</a:t>
             </a:r>
             <a:endParaRPr lang="en-SG" sz="1600" dirty="0">
               <a:solidFill>
@@ -3949,13 +3952,14 @@
           <p:cNvPr id="17" name="Straight Connector 16"/>
           <p:cNvCxnSpPr>
             <a:cxnSpLocks/>
+            <a:stCxn id="16" idx="2"/>
           </p:cNvCxnSpPr>
           <p:nvPr/>
         </p:nvCxnSpPr>
         <p:spPr>
-          <a:xfrm flipH="1">
-            <a:off x="3315939" y="825413"/>
-            <a:ext cx="29544" cy="2213910"/>
+          <a:xfrm>
+            <a:off x="4876801" y="1610684"/>
+            <a:ext cx="3799" cy="2748594"/>
           </a:xfrm>
           <a:prstGeom prst="line">
             <a:avLst/>
@@ -3991,8 +3995,8 @@
         </p:nvSpPr>
         <p:spPr>
           <a:xfrm>
-            <a:off x="3272374" y="917791"/>
-            <a:ext cx="155699" cy="1999143"/>
+            <a:off x="4769945" y="1626318"/>
+            <a:ext cx="224682" cy="2489871"/>
           </a:xfrm>
           <a:prstGeom prst="rect">
             <a:avLst/>
@@ -4043,8 +4047,8 @@
         </p:nvSpPr>
         <p:spPr>
           <a:xfrm>
-            <a:off x="5213820" y="1566467"/>
-            <a:ext cx="852827" cy="317402"/>
+            <a:off x="6737821" y="2343862"/>
+            <a:ext cx="850026" cy="358365"/>
           </a:xfrm>
           <a:prstGeom prst="rect">
             <a:avLst/>
@@ -4106,7 +4110,7 @@
         </p:nvCxnSpPr>
         <p:spPr>
           <a:xfrm>
-            <a:off x="5627253" y="2140249"/>
+            <a:off x="7151253" y="2681425"/>
             <a:ext cx="28210" cy="2686588"/>
           </a:xfrm>
           <a:prstGeom prst="line">
@@ -4143,7 +4147,7 @@
         </p:nvSpPr>
         <p:spPr>
           <a:xfrm>
-            <a:off x="5562601" y="1896584"/>
+            <a:off x="7086601" y="2673980"/>
             <a:ext cx="117613" cy="185051"/>
           </a:xfrm>
           <a:prstGeom prst="rect">
@@ -4197,7 +4201,7 @@
         </p:nvCxnSpPr>
         <p:spPr>
           <a:xfrm>
-            <a:off x="380999" y="929330"/>
+            <a:off x="1905001" y="1978290"/>
             <a:ext cx="1119851" cy="0"/>
           </a:xfrm>
           <a:prstGeom prst="straightConnector1">
@@ -4235,8 +4239,8 @@
         </p:nvCxnSpPr>
         <p:spPr>
           <a:xfrm flipV="1">
-            <a:off x="1653251" y="1125503"/>
-            <a:ext cx="1619123" cy="1"/>
+            <a:off x="3177251" y="1902898"/>
+            <a:ext cx="1596514" cy="1"/>
           </a:xfrm>
           <a:prstGeom prst="straightConnector1">
             <a:avLst/>
@@ -4271,7 +4275,7 @@
         </p:nvSpPr>
         <p:spPr>
           <a:xfrm>
-            <a:off x="13336" y="990595"/>
+            <a:off x="1524000" y="2051160"/>
             <a:ext cx="1424846" cy="369332"/>
           </a:xfrm>
           <a:prstGeom prst="rect">
@@ -4293,7 +4297,43 @@
                 </a:solidFill>
                 <a:latin typeface="Calibri"/>
               </a:rPr>
-              <a:t>execute(“paid 1 200 8 2018”)</a:t>
+              <a:t>execute(“paid </a:t>
+            </a:r>
+            <a:r>
+              <a:rPr lang="en-US" sz="1200" dirty="0" err="1">
+                <a:solidFill>
+                  <a:srgbClr val="0070C0"/>
+                </a:solidFill>
+                <a:latin typeface="Calibri"/>
+              </a:rPr>
+              <a:t>idx</a:t>
+            </a:r>
+            <a:r>
+              <a:rPr lang="en-US" sz="1200" dirty="0">
+                <a:solidFill>
+                  <a:srgbClr val="0070C0"/>
+                </a:solidFill>
+                <a:latin typeface="Calibri"/>
+              </a:rPr>
+              <a:t>/1 </a:t>
+            </a:r>
+            <a:r>
+              <a:rPr lang="en-US" sz="1200" dirty="0" err="1">
+                <a:solidFill>
+                  <a:srgbClr val="0070C0"/>
+                </a:solidFill>
+                <a:latin typeface="Calibri"/>
+              </a:rPr>
+              <a:t>amt</a:t>
+            </a:r>
+            <a:r>
+              <a:rPr lang="en-US" sz="1200" dirty="0">
+                <a:solidFill>
+                  <a:srgbClr val="0070C0"/>
+                </a:solidFill>
+                <a:latin typeface="Calibri"/>
+              </a:rPr>
+              <a:t>/200 m/8 y/2018”)</a:t>
             </a:r>
           </a:p>
         </p:txBody>
@@ -4308,7 +4348,7 @@
         </p:nvCxnSpPr>
         <p:spPr>
           <a:xfrm>
-            <a:off x="4818085" y="1773916"/>
+            <a:off x="6342085" y="2551312"/>
             <a:ext cx="383077" cy="0"/>
           </a:xfrm>
           <a:prstGeom prst="straightConnector1">
@@ -4344,7 +4384,7 @@
         </p:nvSpPr>
         <p:spPr>
           <a:xfrm>
-            <a:off x="3352801" y="2918304"/>
+            <a:off x="4876801" y="4191000"/>
             <a:ext cx="855809" cy="215444"/>
           </a:xfrm>
           <a:prstGeom prst="rect">
@@ -4388,7 +4428,7 @@
         </p:nvCxnSpPr>
         <p:spPr>
           <a:xfrm>
-            <a:off x="4826241" y="2076935"/>
+            <a:off x="6350241" y="2854331"/>
             <a:ext cx="809294" cy="2043"/>
           </a:xfrm>
           <a:prstGeom prst="straightConnector1">
@@ -4428,7 +4468,7 @@
         </p:nvCxnSpPr>
         <p:spPr>
           <a:xfrm flipV="1">
-            <a:off x="1635848" y="2903782"/>
+            <a:off x="3159848" y="4109422"/>
             <a:ext cx="1630852" cy="13156"/>
           </a:xfrm>
           <a:prstGeom prst="straightConnector1">
@@ -4468,7 +4508,7 @@
         </p:nvCxnSpPr>
         <p:spPr>
           <a:xfrm>
-            <a:off x="327666" y="6073660"/>
+            <a:off x="1828801" y="6324600"/>
             <a:ext cx="1196051" cy="0"/>
           </a:xfrm>
           <a:prstGeom prst="straightConnector1">
@@ -4506,7 +4546,7 @@
         </p:nvSpPr>
         <p:spPr>
           <a:xfrm>
-            <a:off x="9808430" y="4945224"/>
+            <a:off x="9470411" y="5486400"/>
             <a:ext cx="878029" cy="228600"/>
           </a:xfrm>
           <a:prstGeom prst="rect">
@@ -4575,7 +4615,7 @@
         </p:nvCxnSpPr>
         <p:spPr>
           <a:xfrm>
-            <a:off x="1622266" y="3156652"/>
+            <a:off x="3146266" y="4429348"/>
             <a:ext cx="3972124" cy="4742"/>
           </a:xfrm>
           <a:prstGeom prst="straightConnector1">
@@ -4611,8 +4651,8 @@
         </p:nvSpPr>
         <p:spPr>
           <a:xfrm>
-            <a:off x="5599895" y="3155974"/>
-            <a:ext cx="88177" cy="2662930"/>
+            <a:off x="7123895" y="4417678"/>
+            <a:ext cx="108529" cy="1942402"/>
           </a:xfrm>
           <a:prstGeom prst="rect">
             <a:avLst/>
@@ -4666,7 +4706,7 @@
         </p:nvCxnSpPr>
         <p:spPr>
           <a:xfrm>
-            <a:off x="10247444" y="5173825"/>
+            <a:off x="9909425" y="5715001"/>
             <a:ext cx="13180" cy="904239"/>
           </a:xfrm>
           <a:prstGeom prst="line">
@@ -4706,7 +4746,7 @@
         </p:nvSpPr>
         <p:spPr>
           <a:xfrm>
-            <a:off x="10187717" y="5250693"/>
+            <a:off x="9849698" y="5769495"/>
             <a:ext cx="119322" cy="45719"/>
           </a:xfrm>
           <a:prstGeom prst="rect">
@@ -4767,7 +4807,7 @@
         </p:nvCxnSpPr>
         <p:spPr>
           <a:xfrm>
-            <a:off x="5678960" y="5475555"/>
+            <a:off x="7202960" y="5948151"/>
             <a:ext cx="183778" cy="5627"/>
           </a:xfrm>
           <a:prstGeom prst="straightConnector1">
@@ -4800,13 +4840,14 @@
           <p:cNvPr id="76" name="Straight Arrow Connector 75"/>
           <p:cNvCxnSpPr>
             <a:cxnSpLocks/>
+            <a:endCxn id="73" idx="2"/>
           </p:cNvCxnSpPr>
           <p:nvPr/>
         </p:nvCxnSpPr>
         <p:spPr>
           <a:xfrm>
-            <a:off x="5708424" y="5274037"/>
-            <a:ext cx="4538954" cy="0"/>
+            <a:off x="7232423" y="5792593"/>
+            <a:ext cx="2676936" cy="22620"/>
           </a:xfrm>
           <a:prstGeom prst="straightConnector1">
             <a:avLst/>
@@ -4849,8 +4890,8 @@
         </p:nvCxnSpPr>
         <p:spPr>
           <a:xfrm flipV="1">
-            <a:off x="1653251" y="5818904"/>
-            <a:ext cx="3990733" cy="31450"/>
+            <a:off x="2749771" y="6360080"/>
+            <a:ext cx="4428389" cy="2"/>
           </a:xfrm>
           <a:prstGeom prst="straightConnector1">
             <a:avLst/>
@@ -4887,8 +4928,8 @@
         </p:nvSpPr>
         <p:spPr>
           <a:xfrm>
-            <a:off x="6136076" y="4927294"/>
-            <a:ext cx="1800153" cy="123111"/>
+            <a:off x="7588715" y="5466040"/>
+            <a:ext cx="1424846" cy="123111"/>
           </a:xfrm>
           <a:prstGeom prst="rect">
             <a:avLst/>
@@ -4919,7 +4960,7 @@
                 </a:solidFill>
                 <a:latin typeface="Calibri"/>
               </a:rPr>
-              <a:t>updateStudentInternalField</a:t>
+              <a:t>updatePerson</a:t>
             </a:r>
             <a:r>
               <a:rPr lang="en-US" sz="800" dirty="0">
@@ -4928,7 +4969,7 @@
                 </a:solidFill>
                 <a:latin typeface="Calibri"/>
               </a:rPr>
-              <a:t>(t, edited)</a:t>
+              <a:t>(edited)</a:t>
             </a:r>
           </a:p>
         </p:txBody>
@@ -4941,8 +4982,8 @@
         </p:nvSpPr>
         <p:spPr>
           <a:xfrm>
-            <a:off x="3552696" y="1620361"/>
-            <a:ext cx="884073" cy="369332"/>
+            <a:off x="5076696" y="2525773"/>
+            <a:ext cx="884073" cy="553998"/>
           </a:xfrm>
           <a:prstGeom prst="rect">
             <a:avLst/>
@@ -4970,7 +5011,31 @@
               <a:rPr lang="en-US" sz="1200" dirty="0">
                 <a:latin typeface="Calibri"/>
               </a:rPr>
-              <a:t>parse(“1 200 82018”)</a:t>
+              <a:t>parse(“</a:t>
+            </a:r>
+            <a:r>
+              <a:rPr lang="en-US" sz="1200" dirty="0" err="1">
+                <a:latin typeface="Calibri"/>
+              </a:rPr>
+              <a:t>idx</a:t>
+            </a:r>
+            <a:r>
+              <a:rPr lang="en-US" sz="1200" dirty="0">
+                <a:latin typeface="Calibri"/>
+              </a:rPr>
+              <a:t>/1 </a:t>
+            </a:r>
+            <a:r>
+              <a:rPr lang="en-US" sz="1200" dirty="0" err="1">
+                <a:latin typeface="Calibri"/>
+              </a:rPr>
+              <a:t>amt</a:t>
+            </a:r>
+            <a:r>
+              <a:rPr lang="en-US" sz="1200" dirty="0">
+                <a:latin typeface="Calibri"/>
+              </a:rPr>
+              <a:t>/200 m/8 y/2018”)</a:t>
             </a:r>
           </a:p>
         </p:txBody>
@@ -4983,8 +5048,8 @@
         </p:nvSpPr>
         <p:spPr>
           <a:xfrm>
-            <a:off x="1742982" y="899005"/>
-            <a:ext cx="1424846" cy="430887"/>
+            <a:off x="3266982" y="1676401"/>
+            <a:ext cx="1424846" cy="646331"/>
           </a:xfrm>
           <a:prstGeom prst="rect">
             <a:avLst/>
@@ -5012,7 +5077,31 @@
               <a:rPr lang="en-US" dirty="0">
                 <a:latin typeface="Calibri"/>
               </a:rPr>
-              <a:t>parse (“paid 1 200 8 2018”)</a:t>
+              <a:t>parse (“paid </a:t>
+            </a:r>
+            <a:r>
+              <a:rPr lang="en-US" dirty="0" err="1">
+                <a:latin typeface="Calibri"/>
+              </a:rPr>
+              <a:t>idx</a:t>
+            </a:r>
+            <a:r>
+              <a:rPr lang="en-US" dirty="0">
+                <a:latin typeface="Calibri"/>
+              </a:rPr>
+              <a:t>/1 </a:t>
+            </a:r>
+            <a:r>
+              <a:rPr lang="en-US" dirty="0" err="1">
+                <a:latin typeface="Calibri"/>
+              </a:rPr>
+              <a:t>amt</a:t>
+            </a:r>
+            <a:r>
+              <a:rPr lang="en-US" dirty="0">
+                <a:latin typeface="Calibri"/>
+              </a:rPr>
+              <a:t>/200 m/8 y/2018”)</a:t>
             </a:r>
           </a:p>
         </p:txBody>
@@ -5025,7 +5114,7 @@
         </p:nvSpPr>
         <p:spPr>
           <a:xfrm>
-            <a:off x="4340137" y="5552347"/>
+            <a:off x="5864137" y="6093523"/>
             <a:ext cx="621216" cy="215444"/>
           </a:xfrm>
           <a:prstGeom prst="rect">
@@ -5067,7 +5156,7 @@
         </p:nvSpPr>
         <p:spPr>
           <a:xfrm>
-            <a:off x="622848" y="5820948"/>
+            <a:off x="2123983" y="6071888"/>
             <a:ext cx="762000" cy="215444"/>
           </a:xfrm>
           <a:prstGeom prst="rect">
@@ -5109,7 +5198,7 @@
         </p:nvSpPr>
         <p:spPr>
           <a:xfrm>
-            <a:off x="5862738" y="5364992"/>
+            <a:off x="7386738" y="5837588"/>
             <a:ext cx="1676400" cy="232379"/>
           </a:xfrm>
           <a:prstGeom prst="rect">
@@ -5151,7 +5240,16 @@
                 </a:solidFill>
                 <a:latin typeface="Calibri"/>
               </a:rPr>
-              <a:t>result:CommandResult</a:t>
+              <a:t>result:Command</a:t>
+            </a:r>
+            <a:r>
+              <a:rPr lang="en-US" sz="1200" dirty="0">
+                <a:solidFill>
+                  <a:prstClr val="white"/>
+                </a:solidFill>
+                <a:latin typeface="Calibri"/>
+              </a:rPr>
+              <a:t> Result</a:t>
             </a:r>
             <a:endParaRPr lang="en-SG" sz="1200" dirty="0">
               <a:solidFill>
@@ -5170,8 +5268,8 @@
         </p:nvSpPr>
         <p:spPr>
           <a:xfrm>
-            <a:off x="6624738" y="5610087"/>
-            <a:ext cx="152400" cy="113636"/>
+            <a:off x="8148738" y="6078283"/>
+            <a:ext cx="152400" cy="171376"/>
           </a:xfrm>
           <a:prstGeom prst="rect">
             <a:avLst/>
@@ -5224,7 +5322,7 @@
         </p:nvCxnSpPr>
         <p:spPr>
           <a:xfrm>
-            <a:off x="5713928" y="5719348"/>
+            <a:off x="7237928" y="6260524"/>
             <a:ext cx="910811" cy="0"/>
           </a:xfrm>
           <a:prstGeom prst="straightConnector1">
@@ -5262,7 +5360,7 @@
         </p:nvSpPr>
         <p:spPr>
           <a:xfrm>
-            <a:off x="2673846" y="2688338"/>
+            <a:off x="4197846" y="3893978"/>
             <a:ext cx="220343" cy="215444"/>
           </a:xfrm>
           <a:prstGeom prst="rect">
@@ -5304,7 +5402,7 @@
         </p:nvSpPr>
         <p:spPr>
           <a:xfrm>
-            <a:off x="3784400" y="975205"/>
+            <a:off x="5308400" y="1752601"/>
             <a:ext cx="1778201" cy="432035"/>
           </a:xfrm>
           <a:prstGeom prst="rect">
@@ -5394,8 +5492,8 @@
         </p:nvCxnSpPr>
         <p:spPr>
           <a:xfrm>
-            <a:off x="3429001" y="1633916"/>
-            <a:ext cx="1191295" cy="0"/>
+            <a:off x="4967981" y="2539328"/>
+            <a:ext cx="1176315" cy="0"/>
           </a:xfrm>
           <a:prstGeom prst="straightConnector1">
             <a:avLst/>
@@ -5428,7 +5526,7 @@
         </p:nvSpPr>
         <p:spPr>
           <a:xfrm>
-            <a:off x="4612242" y="1406027"/>
+            <a:off x="6136242" y="2183423"/>
             <a:ext cx="205843" cy="123165"/>
           </a:xfrm>
           <a:prstGeom prst="rect">
@@ -5482,8 +5580,8 @@
         </p:nvCxnSpPr>
         <p:spPr>
           <a:xfrm>
-            <a:off x="4715288" y="1408834"/>
-            <a:ext cx="0" cy="1657839"/>
+            <a:off x="6239288" y="2175562"/>
+            <a:ext cx="3799" cy="2135303"/>
           </a:xfrm>
           <a:prstGeom prst="line">
             <a:avLst/>
@@ -5519,8 +5617,8 @@
         </p:nvSpPr>
         <p:spPr>
           <a:xfrm>
-            <a:off x="4620592" y="1620202"/>
-            <a:ext cx="198331" cy="1290158"/>
+            <a:off x="6144592" y="2539330"/>
+            <a:ext cx="201395" cy="1575470"/>
           </a:xfrm>
           <a:prstGeom prst="rect">
             <a:avLst/>
@@ -5573,7 +5671,7 @@
         </p:nvCxnSpPr>
         <p:spPr>
           <a:xfrm>
-            <a:off x="3459520" y="2903421"/>
+            <a:off x="4983520" y="4109061"/>
             <a:ext cx="1165315" cy="1"/>
           </a:xfrm>
           <a:prstGeom prst="straightConnector1">
@@ -5613,7 +5711,7 @@
         </p:nvCxnSpPr>
         <p:spPr>
           <a:xfrm flipV="1">
-            <a:off x="3429001" y="1242355"/>
+            <a:off x="4953001" y="2019751"/>
             <a:ext cx="358137" cy="3411"/>
           </a:xfrm>
           <a:prstGeom prst="straightConnector1">
@@ -5651,8 +5749,8 @@
         </p:nvCxnSpPr>
         <p:spPr>
           <a:xfrm>
-            <a:off x="3439965" y="1521330"/>
-            <a:ext cx="1172400" cy="0"/>
+            <a:off x="4983519" y="2298726"/>
+            <a:ext cx="1152846" cy="0"/>
           </a:xfrm>
           <a:prstGeom prst="straightConnector1">
             <a:avLst/>
@@ -5689,7 +5787,7 @@
         </p:nvSpPr>
         <p:spPr>
           <a:xfrm>
-            <a:off x="4500623" y="2916393"/>
+            <a:off x="6015902" y="4156741"/>
             <a:ext cx="463460" cy="261610"/>
           </a:xfrm>
           <a:prstGeom prst="rect">
@@ -5729,7 +5827,7 @@
         </p:nvSpPr>
         <p:spPr>
           <a:xfrm>
-            <a:off x="5219907" y="2165432"/>
+            <a:off x="6743907" y="2942828"/>
             <a:ext cx="850026" cy="335501"/>
           </a:xfrm>
           <a:prstGeom prst="rect">
@@ -5808,8 +5906,8 @@
         </p:nvSpPr>
         <p:spPr>
           <a:xfrm>
-            <a:off x="5584920" y="2591737"/>
-            <a:ext cx="100601" cy="318257"/>
+            <a:off x="7108920" y="3285313"/>
+            <a:ext cx="125330" cy="847461"/>
           </a:xfrm>
           <a:prstGeom prst="rect">
             <a:avLst/>
@@ -5863,13 +5961,14 @@
           </p:cNvPr>
           <p:cNvCxnSpPr>
             <a:cxnSpLocks/>
+            <a:endCxn id="74" idx="1"/>
           </p:cNvCxnSpPr>
           <p:nvPr/>
         </p:nvCxnSpPr>
         <p:spPr>
-          <a:xfrm flipV="1">
-            <a:off x="4725418" y="2328883"/>
-            <a:ext cx="497670" cy="3325"/>
+          <a:xfrm>
+            <a:off x="6369315" y="3108444"/>
+            <a:ext cx="374592" cy="2134"/>
           </a:xfrm>
           <a:prstGeom prst="straightConnector1">
             <a:avLst/>
@@ -5910,7 +6009,7 @@
         </p:nvSpPr>
         <p:spPr>
           <a:xfrm>
-            <a:off x="4426913" y="2319867"/>
+            <a:off x="6103945" y="3136520"/>
             <a:ext cx="621216" cy="215444"/>
           </a:xfrm>
           <a:prstGeom prst="rect">
@@ -5961,8 +6060,8 @@
         </p:nvCxnSpPr>
         <p:spPr>
           <a:xfrm flipV="1">
-            <a:off x="5678960" y="5059524"/>
-            <a:ext cx="4129470" cy="22620"/>
+            <a:off x="7202960" y="5600700"/>
+            <a:ext cx="2267450" cy="13998"/>
           </a:xfrm>
           <a:prstGeom prst="straightConnector1">
             <a:avLst/>
@@ -6005,7 +6104,7 @@
         </p:nvCxnSpPr>
         <p:spPr>
           <a:xfrm>
-            <a:off x="4837669" y="2903420"/>
+            <a:off x="6361669" y="4109060"/>
             <a:ext cx="733069" cy="6940"/>
           </a:xfrm>
           <a:prstGeom prst="straightConnector1">
@@ -6049,7 +6148,7 @@
         </p:nvSpPr>
         <p:spPr>
           <a:xfrm>
-            <a:off x="6637050" y="3089821"/>
+            <a:off x="8161050" y="4362517"/>
             <a:ext cx="926621" cy="230693"/>
           </a:xfrm>
           <a:prstGeom prst="rect">
@@ -6091,7 +6190,7 @@
                 </a:solidFill>
                 <a:latin typeface="Calibri"/>
               </a:rPr>
-              <a:t>t:Student</a:t>
+              <a:t>t:Person</a:t>
             </a:r>
             <a:endParaRPr lang="en-SG" sz="1200" dirty="0">
               <a:solidFill>
@@ -6116,7 +6215,7 @@
         </p:nvSpPr>
         <p:spPr>
           <a:xfrm>
-            <a:off x="7005165" y="3321056"/>
+            <a:off x="8529165" y="4593752"/>
             <a:ext cx="144923" cy="102175"/>
           </a:xfrm>
           <a:prstGeom prst="rect">
@@ -6171,13 +6270,14 @@
           </p:cNvPr>
           <p:cNvCxnSpPr>
             <a:cxnSpLocks/>
+            <a:endCxn id="110" idx="1"/>
           </p:cNvCxnSpPr>
           <p:nvPr/>
         </p:nvCxnSpPr>
         <p:spPr>
           <a:xfrm>
-            <a:off x="5635220" y="3197778"/>
-            <a:ext cx="989518" cy="1090"/>
+            <a:off x="7235979" y="4476947"/>
+            <a:ext cx="925070" cy="916"/>
           </a:xfrm>
           <a:prstGeom prst="straightConnector1">
             <a:avLst/>
@@ -6218,7 +6318,7 @@
         </p:nvSpPr>
         <p:spPr>
           <a:xfrm>
-            <a:off x="5465880" y="3035959"/>
+            <a:off x="6989880" y="4308655"/>
             <a:ext cx="1150818" cy="107722"/>
           </a:xfrm>
           <a:prstGeom prst="rect">
@@ -6275,8 +6375,8 @@
         </p:nvCxnSpPr>
         <p:spPr>
           <a:xfrm>
-            <a:off x="5685521" y="3418323"/>
-            <a:ext cx="1392106" cy="4908"/>
+            <a:off x="7244116" y="4692004"/>
+            <a:ext cx="1357510" cy="3923"/>
           </a:xfrm>
           <a:prstGeom prst="straightConnector1">
             <a:avLst/>
@@ -6319,8 +6419,8 @@
         </p:nvSpPr>
         <p:spPr>
           <a:xfrm>
-            <a:off x="7024015" y="4723781"/>
-            <a:ext cx="187553" cy="102797"/>
+            <a:off x="8548015" y="5077292"/>
+            <a:ext cx="135553" cy="327233"/>
           </a:xfrm>
           <a:prstGeom prst="rect">
             <a:avLst/>
@@ -6379,9 +6479,9 @@
           <p:nvPr/>
         </p:nvCxnSpPr>
         <p:spPr>
-          <a:xfrm>
-            <a:off x="5655463" y="4620278"/>
-            <a:ext cx="981587" cy="0"/>
+          <a:xfrm flipV="1">
+            <a:off x="7235979" y="4948093"/>
+            <a:ext cx="925070" cy="4908"/>
           </a:xfrm>
           <a:prstGeom prst="straightConnector1">
             <a:avLst/>
@@ -6425,8 +6525,8 @@
         </p:nvCxnSpPr>
         <p:spPr>
           <a:xfrm>
-            <a:off x="5667212" y="4826578"/>
-            <a:ext cx="1450580" cy="0"/>
+            <a:off x="7244117" y="5404524"/>
+            <a:ext cx="1371675" cy="0"/>
           </a:xfrm>
           <a:prstGeom prst="straightConnector1">
             <a:avLst/>
@@ -6469,8 +6569,8 @@
         </p:nvSpPr>
         <p:spPr>
           <a:xfrm>
-            <a:off x="6637050" y="4504931"/>
-            <a:ext cx="989046" cy="230693"/>
+            <a:off x="8161050" y="4832747"/>
+            <a:ext cx="926621" cy="230693"/>
           </a:xfrm>
           <a:prstGeom prst="rect">
             <a:avLst/>
@@ -6511,7 +6611,7 @@
                 </a:solidFill>
                 <a:latin typeface="Calibri"/>
               </a:rPr>
-              <a:t>edited:Student</a:t>
+              <a:t>edited:Person</a:t>
             </a:r>
             <a:endParaRPr lang="en-SG" sz="1000" dirty="0">
               <a:solidFill>
@@ -6519,767 +6619,6 @@
               </a:solidFill>
               <a:latin typeface="Calibri"/>
             </a:endParaRPr>
-          </a:p>
-        </p:txBody>
-      </p:sp>
-      <p:cxnSp>
-        <p:nvCxnSpPr>
-          <p:cNvPr id="89" name="Straight Connector 88">
-            <a:extLst>
-              <a:ext uri="{FF2B5EF4-FFF2-40B4-BE49-F238E27FC236}">
-                <a16:creationId xmlns:a16="http://schemas.microsoft.com/office/drawing/2014/main" id="{3C52FF72-1AFF-4CFD-B58A-8AA853F51E06}"/>
-              </a:ext>
-            </a:extLst>
-          </p:cNvPr>
-          <p:cNvCxnSpPr>
-            <a:cxnSpLocks/>
-          </p:cNvCxnSpPr>
-          <p:nvPr/>
-        </p:nvCxnSpPr>
-        <p:spPr>
-          <a:xfrm>
-            <a:off x="7077627" y="3299962"/>
-            <a:ext cx="0" cy="728478"/>
-          </a:xfrm>
-          <a:prstGeom prst="line">
-            <a:avLst/>
-          </a:prstGeom>
-          <a:ln w="19050">
-            <a:solidFill>
-              <a:srgbClr val="0070C0"/>
-            </a:solidFill>
-            <a:prstDash val="sysDash"/>
-          </a:ln>
-          <a:effectLst/>
-        </p:spPr>
-        <p:style>
-          <a:lnRef idx="1">
-            <a:schemeClr val="accent1"/>
-          </a:lnRef>
-          <a:fillRef idx="2">
-            <a:schemeClr val="accent1"/>
-          </a:fillRef>
-          <a:effectRef idx="1">
-            <a:schemeClr val="accent1"/>
-          </a:effectRef>
-          <a:fontRef idx="minor">
-            <a:schemeClr val="dk1"/>
-          </a:fontRef>
-        </p:style>
-      </p:cxnSp>
-      <p:sp>
-        <p:nvSpPr>
-          <p:cNvPr id="91" name="Rectangle 90">
-            <a:extLst>
-              <a:ext uri="{FF2B5EF4-FFF2-40B4-BE49-F238E27FC236}">
-                <a16:creationId xmlns:a16="http://schemas.microsoft.com/office/drawing/2014/main" id="{27739D36-84D0-4EC7-99BB-3DC63996C25E}"/>
-              </a:ext>
-            </a:extLst>
-          </p:cNvPr>
-          <p:cNvSpPr/>
-          <p:nvPr/>
-        </p:nvSpPr>
-        <p:spPr>
-          <a:xfrm>
-            <a:off x="7014536" y="3533248"/>
-            <a:ext cx="124308" cy="402673"/>
-          </a:xfrm>
-          <a:prstGeom prst="rect">
-            <a:avLst/>
-          </a:prstGeom>
-          <a:solidFill>
-            <a:srgbClr val="0070C0"/>
-          </a:solidFill>
-          <a:ln>
-            <a:solidFill>
-              <a:srgbClr val="0070C0"/>
-            </a:solidFill>
-          </a:ln>
-          <a:effectLst/>
-        </p:spPr>
-        <p:style>
-          <a:lnRef idx="1">
-            <a:schemeClr val="accent3"/>
-          </a:lnRef>
-          <a:fillRef idx="2">
-            <a:schemeClr val="accent3"/>
-          </a:fillRef>
-          <a:effectRef idx="1">
-            <a:schemeClr val="accent3"/>
-          </a:effectRef>
-          <a:fontRef idx="minor">
-            <a:schemeClr val="dk1"/>
-          </a:fontRef>
-        </p:style>
-        <p:txBody>
-          <a:bodyPr rtlCol="0" anchor="ctr"/>
-          <a:lstStyle/>
-          <a:p>
-            <a:pPr algn="ctr"/>
-            <a:endParaRPr lang="en-SG" sz="1400">
-              <a:solidFill>
-                <a:prstClr val="black"/>
-              </a:solidFill>
-              <a:latin typeface="Calibri"/>
-            </a:endParaRPr>
-          </a:p>
-        </p:txBody>
-      </p:sp>
-      <p:cxnSp>
-        <p:nvCxnSpPr>
-          <p:cNvPr id="94" name="Straight Arrow Connector 93">
-            <a:extLst>
-              <a:ext uri="{FF2B5EF4-FFF2-40B4-BE49-F238E27FC236}">
-                <a16:creationId xmlns:a16="http://schemas.microsoft.com/office/drawing/2014/main" id="{42384EDF-EAEC-4D9B-B300-246D17B69F64}"/>
-              </a:ext>
-            </a:extLst>
-          </p:cNvPr>
-          <p:cNvCxnSpPr>
-            <a:cxnSpLocks/>
-          </p:cNvCxnSpPr>
-          <p:nvPr/>
-        </p:nvCxnSpPr>
-        <p:spPr>
-          <a:xfrm>
-            <a:off x="5673586" y="3925537"/>
-            <a:ext cx="1392106" cy="4908"/>
-          </a:xfrm>
-          <a:prstGeom prst="straightConnector1">
-            <a:avLst/>
-          </a:prstGeom>
-          <a:ln w="19050">
-            <a:solidFill>
-              <a:srgbClr val="0070C0"/>
-            </a:solidFill>
-            <a:prstDash val="sysDash"/>
-            <a:headEnd type="arrow" w="med" len="med"/>
-            <a:tailEnd type="none" w="med" len="med"/>
-          </a:ln>
-        </p:spPr>
-        <p:style>
-          <a:lnRef idx="1">
-            <a:schemeClr val="accent1"/>
-          </a:lnRef>
-          <a:fillRef idx="0">
-            <a:schemeClr val="accent1"/>
-          </a:fillRef>
-          <a:effectRef idx="0">
-            <a:schemeClr val="accent1"/>
-          </a:effectRef>
-          <a:fontRef idx="minor">
-            <a:schemeClr val="tx1"/>
-          </a:fontRef>
-        </p:style>
-      </p:cxnSp>
-      <p:cxnSp>
-        <p:nvCxnSpPr>
-          <p:cNvPr id="96" name="Straight Arrow Connector 95">
-            <a:extLst>
-              <a:ext uri="{FF2B5EF4-FFF2-40B4-BE49-F238E27FC236}">
-                <a16:creationId xmlns:a16="http://schemas.microsoft.com/office/drawing/2014/main" id="{5C148ACD-B02E-4E4C-A941-E725C5C105DF}"/>
-              </a:ext>
-            </a:extLst>
-          </p:cNvPr>
-          <p:cNvCxnSpPr>
-            <a:cxnSpLocks/>
-          </p:cNvCxnSpPr>
-          <p:nvPr/>
-        </p:nvCxnSpPr>
-        <p:spPr>
-          <a:xfrm>
-            <a:off x="7140720" y="3602424"/>
-            <a:ext cx="591040" cy="141"/>
-          </a:xfrm>
-          <a:prstGeom prst="straightConnector1">
-            <a:avLst/>
-          </a:prstGeom>
-          <a:ln w="19050">
-            <a:solidFill>
-              <a:srgbClr val="0070C0"/>
-            </a:solidFill>
-            <a:tailEnd type="arrow"/>
-          </a:ln>
-        </p:spPr>
-        <p:style>
-          <a:lnRef idx="1">
-            <a:schemeClr val="accent1"/>
-          </a:lnRef>
-          <a:fillRef idx="0">
-            <a:schemeClr val="accent1"/>
-          </a:fillRef>
-          <a:effectRef idx="0">
-            <a:schemeClr val="accent1"/>
-          </a:effectRef>
-          <a:fontRef idx="minor">
-            <a:schemeClr val="tx1"/>
-          </a:fontRef>
-        </p:style>
-      </p:cxnSp>
-      <p:cxnSp>
-        <p:nvCxnSpPr>
-          <p:cNvPr id="97" name="Straight Arrow Connector 96">
-            <a:extLst>
-              <a:ext uri="{FF2B5EF4-FFF2-40B4-BE49-F238E27FC236}">
-                <a16:creationId xmlns:a16="http://schemas.microsoft.com/office/drawing/2014/main" id="{19ADF5F6-152B-4A86-9E88-3F66FD422235}"/>
-              </a:ext>
-            </a:extLst>
-          </p:cNvPr>
-          <p:cNvCxnSpPr>
-            <a:cxnSpLocks/>
-          </p:cNvCxnSpPr>
-          <p:nvPr/>
-        </p:nvCxnSpPr>
-        <p:spPr>
-          <a:xfrm>
-            <a:off x="7138843" y="3820487"/>
-            <a:ext cx="972781" cy="0"/>
-          </a:xfrm>
-          <a:prstGeom prst="straightConnector1">
-            <a:avLst/>
-          </a:prstGeom>
-          <a:ln w="19050">
-            <a:solidFill>
-              <a:srgbClr val="0070C0"/>
-            </a:solidFill>
-            <a:prstDash val="sysDash"/>
-            <a:headEnd type="arrow" w="med" len="med"/>
-            <a:tailEnd type="none" w="med" len="med"/>
-          </a:ln>
-        </p:spPr>
-        <p:style>
-          <a:lnRef idx="1">
-            <a:schemeClr val="accent1"/>
-          </a:lnRef>
-          <a:fillRef idx="0">
-            <a:schemeClr val="accent1"/>
-          </a:fillRef>
-          <a:effectRef idx="0">
-            <a:schemeClr val="accent1"/>
-          </a:effectRef>
-          <a:fontRef idx="minor">
-            <a:schemeClr val="tx1"/>
-          </a:fontRef>
-        </p:style>
-      </p:cxnSp>
-      <p:sp>
-        <p:nvSpPr>
-          <p:cNvPr id="98" name="TextBox 97">
-            <a:extLst>
-              <a:ext uri="{FF2B5EF4-FFF2-40B4-BE49-F238E27FC236}">
-                <a16:creationId xmlns:a16="http://schemas.microsoft.com/office/drawing/2014/main" id="{6BF14BD3-52B4-486D-8DBE-D7B6178D4C1A}"/>
-              </a:ext>
-            </a:extLst>
-          </p:cNvPr>
-          <p:cNvSpPr txBox="1"/>
-          <p:nvPr/>
-        </p:nvSpPr>
-        <p:spPr>
-          <a:xfrm>
-            <a:off x="6584159" y="3435937"/>
-            <a:ext cx="1150818" cy="107722"/>
-          </a:xfrm>
-          <a:prstGeom prst="rect">
-            <a:avLst/>
-          </a:prstGeom>
-          <a:noFill/>
-        </p:spPr>
-        <p:txBody>
-          <a:bodyPr wrap="square" lIns="0" tIns="0" rIns="0" bIns="0" rtlCol="0">
-            <a:spAutoFit/>
-          </a:bodyPr>
-          <a:lstStyle>
-            <a:defPPr>
-              <a:defRPr lang="en-US"/>
-            </a:defPPr>
-            <a:lvl1pPr algn="r">
-              <a:defRPr sz="1400">
-                <a:solidFill>
-                  <a:srgbClr val="0070C0"/>
-                </a:solidFill>
-              </a:defRPr>
-            </a:lvl1pPr>
-          </a:lstStyle>
-          <a:p>
-            <a:r>
-              <a:rPr lang="en-US" sz="700" dirty="0" err="1">
-                <a:latin typeface="Calibri"/>
-              </a:rPr>
-              <a:t>getPayments</a:t>
-            </a:r>
-            <a:r>
-              <a:rPr lang="en-US" sz="700" dirty="0">
-                <a:latin typeface="Calibri"/>
-              </a:rPr>
-              <a:t>()</a:t>
-            </a:r>
-          </a:p>
-        </p:txBody>
-      </p:sp>
-      <p:sp>
-        <p:nvSpPr>
-          <p:cNvPr id="99" name="Rectangle 62">
-            <a:extLst>
-              <a:ext uri="{FF2B5EF4-FFF2-40B4-BE49-F238E27FC236}">
-                <a16:creationId xmlns:a16="http://schemas.microsoft.com/office/drawing/2014/main" id="{FBE52BE1-83B1-4044-832A-21CFA28B823E}"/>
-              </a:ext>
-            </a:extLst>
-          </p:cNvPr>
-          <p:cNvSpPr/>
-          <p:nvPr/>
-        </p:nvSpPr>
-        <p:spPr>
-          <a:xfrm>
-            <a:off x="7743509" y="3487077"/>
-            <a:ext cx="926621" cy="230693"/>
-          </a:xfrm>
-          <a:prstGeom prst="rect">
-            <a:avLst/>
-          </a:prstGeom>
-          <a:solidFill>
-            <a:srgbClr val="0070C0"/>
-          </a:solidFill>
-          <a:ln w="19050">
-            <a:solidFill>
-              <a:srgbClr val="0070C0"/>
-            </a:solidFill>
-          </a:ln>
-          <a:effectLst/>
-        </p:spPr>
-        <p:style>
-          <a:lnRef idx="1">
-            <a:schemeClr val="accent2"/>
-          </a:lnRef>
-          <a:fillRef idx="2">
-            <a:schemeClr val="accent2"/>
-          </a:fillRef>
-          <a:effectRef idx="1">
-            <a:schemeClr val="accent2"/>
-          </a:effectRef>
-          <a:fontRef idx="minor">
-            <a:schemeClr val="dk1"/>
-          </a:fontRef>
-        </p:style>
-        <p:txBody>
-          <a:bodyPr rtlCol="0" anchor="ctr"/>
-          <a:lstStyle/>
-          <a:p>
-            <a:pPr algn="ctr"/>
-            <a:r>
-              <a:rPr lang="en-US" sz="800" dirty="0">
-                <a:solidFill>
-                  <a:prstClr val="white"/>
-                </a:solidFill>
-                <a:latin typeface="Calibri"/>
-              </a:rPr>
-              <a:t>l:List&lt;Payments&gt;</a:t>
-            </a:r>
-            <a:endParaRPr lang="en-SG" sz="800" dirty="0">
-              <a:solidFill>
-                <a:prstClr val="white"/>
-              </a:solidFill>
-              <a:latin typeface="Calibri"/>
-            </a:endParaRPr>
-          </a:p>
-        </p:txBody>
-      </p:sp>
-      <p:sp>
-        <p:nvSpPr>
-          <p:cNvPr id="100" name="Rectangle 99">
-            <a:extLst>
-              <a:ext uri="{FF2B5EF4-FFF2-40B4-BE49-F238E27FC236}">
-                <a16:creationId xmlns:a16="http://schemas.microsoft.com/office/drawing/2014/main" id="{D229B755-5805-4A80-91B2-FEDEE15C495C}"/>
-              </a:ext>
-            </a:extLst>
-          </p:cNvPr>
-          <p:cNvSpPr/>
-          <p:nvPr/>
-        </p:nvSpPr>
-        <p:spPr>
-          <a:xfrm>
-            <a:off x="8111624" y="3718312"/>
-            <a:ext cx="144923" cy="102175"/>
-          </a:xfrm>
-          <a:prstGeom prst="rect">
-            <a:avLst/>
-          </a:prstGeom>
-          <a:solidFill>
-            <a:srgbClr val="0070C0"/>
-          </a:solidFill>
-          <a:ln>
-            <a:solidFill>
-              <a:srgbClr val="0070C0"/>
-            </a:solidFill>
-          </a:ln>
-          <a:effectLst/>
-        </p:spPr>
-        <p:style>
-          <a:lnRef idx="1">
-            <a:schemeClr val="accent3"/>
-          </a:lnRef>
-          <a:fillRef idx="2">
-            <a:schemeClr val="accent3"/>
-          </a:fillRef>
-          <a:effectRef idx="1">
-            <a:schemeClr val="accent3"/>
-          </a:effectRef>
-          <a:fontRef idx="minor">
-            <a:schemeClr val="dk1"/>
-          </a:fontRef>
-        </p:style>
-        <p:txBody>
-          <a:bodyPr rtlCol="0" anchor="ctr"/>
-          <a:lstStyle/>
-          <a:p>
-            <a:pPr algn="ctr"/>
-            <a:endParaRPr lang="en-SG" sz="1400">
-              <a:solidFill>
-                <a:prstClr val="black"/>
-              </a:solidFill>
-              <a:latin typeface="Calibri"/>
-            </a:endParaRPr>
-          </a:p>
-        </p:txBody>
-      </p:sp>
-      <p:sp>
-        <p:nvSpPr>
-          <p:cNvPr id="101" name="TextBox 100">
-            <a:extLst>
-              <a:ext uri="{FF2B5EF4-FFF2-40B4-BE49-F238E27FC236}">
-                <a16:creationId xmlns:a16="http://schemas.microsoft.com/office/drawing/2014/main" id="{4FFDA7D7-5B61-4979-83C4-DE0F52D01109}"/>
-              </a:ext>
-            </a:extLst>
-          </p:cNvPr>
-          <p:cNvSpPr txBox="1"/>
-          <p:nvPr/>
-        </p:nvSpPr>
-        <p:spPr>
-          <a:xfrm>
-            <a:off x="6197815" y="3712105"/>
-            <a:ext cx="220343" cy="215444"/>
-          </a:xfrm>
-          <a:prstGeom prst="rect">
-            <a:avLst/>
-          </a:prstGeom>
-          <a:noFill/>
-        </p:spPr>
-        <p:txBody>
-          <a:bodyPr wrap="square" lIns="0" tIns="0" rIns="0" bIns="0" rtlCol="0">
-            <a:spAutoFit/>
-          </a:bodyPr>
-          <a:lstStyle>
-            <a:defPPr>
-              <a:defRPr lang="en-US"/>
-            </a:defPPr>
-            <a:lvl1pPr algn="r">
-              <a:defRPr sz="1400">
-                <a:solidFill>
-                  <a:srgbClr val="0070C0"/>
-                </a:solidFill>
-              </a:defRPr>
-            </a:lvl1pPr>
-          </a:lstStyle>
-          <a:p>
-            <a:r>
-              <a:rPr lang="en-US" dirty="0">
-                <a:latin typeface="Calibri"/>
-              </a:rPr>
-              <a:t>l</a:t>
-            </a:r>
-          </a:p>
-        </p:txBody>
-      </p:sp>
-      <p:cxnSp>
-        <p:nvCxnSpPr>
-          <p:cNvPr id="102" name="Straight Connector 101">
-            <a:extLst>
-              <a:ext uri="{FF2B5EF4-FFF2-40B4-BE49-F238E27FC236}">
-                <a16:creationId xmlns:a16="http://schemas.microsoft.com/office/drawing/2014/main" id="{347EB980-93F3-4661-BFCE-7572AC377838}"/>
-              </a:ext>
-            </a:extLst>
-          </p:cNvPr>
-          <p:cNvCxnSpPr>
-            <a:cxnSpLocks/>
-          </p:cNvCxnSpPr>
-          <p:nvPr/>
-        </p:nvCxnSpPr>
-        <p:spPr>
-          <a:xfrm>
-            <a:off x="8180668" y="3640396"/>
-            <a:ext cx="0" cy="723324"/>
-          </a:xfrm>
-          <a:prstGeom prst="line">
-            <a:avLst/>
-          </a:prstGeom>
-          <a:ln w="19050">
-            <a:solidFill>
-              <a:srgbClr val="0070C0"/>
-            </a:solidFill>
-            <a:prstDash val="sysDash"/>
-          </a:ln>
-          <a:effectLst/>
-        </p:spPr>
-        <p:style>
-          <a:lnRef idx="1">
-            <a:schemeClr val="accent1"/>
-          </a:lnRef>
-          <a:fillRef idx="2">
-            <a:schemeClr val="accent1"/>
-          </a:fillRef>
-          <a:effectRef idx="1">
-            <a:schemeClr val="accent1"/>
-          </a:effectRef>
-          <a:fontRef idx="minor">
-            <a:schemeClr val="dk1"/>
-          </a:fontRef>
-        </p:style>
-      </p:cxnSp>
-      <p:sp>
-        <p:nvSpPr>
-          <p:cNvPr id="103" name="Rectangle 102">
-            <a:extLst>
-              <a:ext uri="{FF2B5EF4-FFF2-40B4-BE49-F238E27FC236}">
-                <a16:creationId xmlns:a16="http://schemas.microsoft.com/office/drawing/2014/main" id="{A13B574E-3DBC-4EE8-ACDD-D66B11DFF994}"/>
-              </a:ext>
-            </a:extLst>
-          </p:cNvPr>
-          <p:cNvSpPr/>
-          <p:nvPr/>
-        </p:nvSpPr>
-        <p:spPr>
-          <a:xfrm>
-            <a:off x="8117578" y="4097316"/>
-            <a:ext cx="138942" cy="266402"/>
-          </a:xfrm>
-          <a:prstGeom prst="rect">
-            <a:avLst/>
-          </a:prstGeom>
-          <a:solidFill>
-            <a:srgbClr val="0070C0"/>
-          </a:solidFill>
-          <a:ln>
-            <a:solidFill>
-              <a:srgbClr val="0070C0"/>
-            </a:solidFill>
-          </a:ln>
-          <a:effectLst/>
-        </p:spPr>
-        <p:style>
-          <a:lnRef idx="1">
-            <a:schemeClr val="accent3"/>
-          </a:lnRef>
-          <a:fillRef idx="2">
-            <a:schemeClr val="accent3"/>
-          </a:fillRef>
-          <a:effectRef idx="1">
-            <a:schemeClr val="accent3"/>
-          </a:effectRef>
-          <a:fontRef idx="minor">
-            <a:schemeClr val="dk1"/>
-          </a:fontRef>
-        </p:style>
-        <p:txBody>
-          <a:bodyPr rtlCol="0" anchor="ctr"/>
-          <a:lstStyle/>
-          <a:p>
-            <a:pPr algn="ctr"/>
-            <a:endParaRPr lang="en-SG" sz="1400">
-              <a:solidFill>
-                <a:prstClr val="black"/>
-              </a:solidFill>
-              <a:latin typeface="Calibri"/>
-            </a:endParaRPr>
-          </a:p>
-        </p:txBody>
-      </p:sp>
-      <p:cxnSp>
-        <p:nvCxnSpPr>
-          <p:cNvPr id="107" name="Straight Arrow Connector 106">
-            <a:extLst>
-              <a:ext uri="{FF2B5EF4-FFF2-40B4-BE49-F238E27FC236}">
-                <a16:creationId xmlns:a16="http://schemas.microsoft.com/office/drawing/2014/main" id="{4E152355-9291-4494-9655-286C83458D28}"/>
-              </a:ext>
-            </a:extLst>
-          </p:cNvPr>
-          <p:cNvCxnSpPr>
-            <a:cxnSpLocks/>
-          </p:cNvCxnSpPr>
-          <p:nvPr/>
-        </p:nvCxnSpPr>
-        <p:spPr>
-          <a:xfrm>
-            <a:off x="5689976" y="4097316"/>
-            <a:ext cx="2421648" cy="0"/>
-          </a:xfrm>
-          <a:prstGeom prst="straightConnector1">
-            <a:avLst/>
-          </a:prstGeom>
-          <a:ln w="19050">
-            <a:solidFill>
-              <a:srgbClr val="0070C0"/>
-            </a:solidFill>
-            <a:tailEnd type="arrow"/>
-          </a:ln>
-        </p:spPr>
-        <p:style>
-          <a:lnRef idx="1">
-            <a:schemeClr val="accent1"/>
-          </a:lnRef>
-          <a:fillRef idx="0">
-            <a:schemeClr val="accent1"/>
-          </a:fillRef>
-          <a:effectRef idx="0">
-            <a:schemeClr val="accent1"/>
-          </a:effectRef>
-          <a:fontRef idx="minor">
-            <a:schemeClr val="tx1"/>
-          </a:fontRef>
-        </p:style>
-      </p:cxnSp>
-      <p:sp>
-        <p:nvSpPr>
-          <p:cNvPr id="114" name="TextBox 113">
-            <a:extLst>
-              <a:ext uri="{FF2B5EF4-FFF2-40B4-BE49-F238E27FC236}">
-                <a16:creationId xmlns:a16="http://schemas.microsoft.com/office/drawing/2014/main" id="{CED1B44B-EFE6-42B0-8D8B-B466893BD71D}"/>
-              </a:ext>
-            </a:extLst>
-          </p:cNvPr>
-          <p:cNvSpPr txBox="1"/>
-          <p:nvPr/>
-        </p:nvSpPr>
-        <p:spPr>
-          <a:xfrm>
-            <a:off x="6821720" y="3966195"/>
-            <a:ext cx="1150818" cy="107722"/>
-          </a:xfrm>
-          <a:prstGeom prst="rect">
-            <a:avLst/>
-          </a:prstGeom>
-          <a:noFill/>
-        </p:spPr>
-        <p:txBody>
-          <a:bodyPr wrap="square" lIns="0" tIns="0" rIns="0" bIns="0" rtlCol="0">
-            <a:spAutoFit/>
-          </a:bodyPr>
-          <a:lstStyle>
-            <a:defPPr>
-              <a:defRPr lang="en-US"/>
-            </a:defPPr>
-            <a:lvl1pPr algn="r">
-              <a:defRPr sz="1400">
-                <a:solidFill>
-                  <a:srgbClr val="0070C0"/>
-                </a:solidFill>
-              </a:defRPr>
-            </a:lvl1pPr>
-          </a:lstStyle>
-          <a:p>
-            <a:r>
-              <a:rPr lang="en-US" sz="700" dirty="0" err="1">
-                <a:latin typeface="Calibri"/>
-              </a:rPr>
-              <a:t>updatePayments</a:t>
-            </a:r>
-            <a:r>
-              <a:rPr lang="en-US" sz="700" dirty="0">
-                <a:latin typeface="Calibri"/>
-              </a:rPr>
-              <a:t>(l, p)</a:t>
-            </a:r>
-          </a:p>
-        </p:txBody>
-      </p:sp>
-      <p:cxnSp>
-        <p:nvCxnSpPr>
-          <p:cNvPr id="115" name="Straight Arrow Connector 114">
-            <a:extLst>
-              <a:ext uri="{FF2B5EF4-FFF2-40B4-BE49-F238E27FC236}">
-                <a16:creationId xmlns:a16="http://schemas.microsoft.com/office/drawing/2014/main" id="{2639CACC-CC7D-4331-AA72-1D1467FB44F6}"/>
-              </a:ext>
-            </a:extLst>
-          </p:cNvPr>
-          <p:cNvCxnSpPr>
-            <a:cxnSpLocks/>
-          </p:cNvCxnSpPr>
-          <p:nvPr/>
-        </p:nvCxnSpPr>
-        <p:spPr>
-          <a:xfrm>
-            <a:off x="5655463" y="4363718"/>
-            <a:ext cx="2456160" cy="0"/>
-          </a:xfrm>
-          <a:prstGeom prst="straightConnector1">
-            <a:avLst/>
-          </a:prstGeom>
-          <a:ln w="19050">
-            <a:solidFill>
-              <a:srgbClr val="0070C0"/>
-            </a:solidFill>
-            <a:prstDash val="sysDash"/>
-            <a:headEnd type="arrow" w="med" len="med"/>
-            <a:tailEnd type="none" w="med" len="med"/>
-          </a:ln>
-        </p:spPr>
-        <p:style>
-          <a:lnRef idx="1">
-            <a:schemeClr val="accent1"/>
-          </a:lnRef>
-          <a:fillRef idx="0">
-            <a:schemeClr val="accent1"/>
-          </a:fillRef>
-          <a:effectRef idx="0">
-            <a:schemeClr val="accent1"/>
-          </a:effectRef>
-          <a:fontRef idx="minor">
-            <a:schemeClr val="tx1"/>
-          </a:fontRef>
-        </p:style>
-      </p:cxnSp>
-      <p:sp>
-        <p:nvSpPr>
-          <p:cNvPr id="118" name="TextBox 117">
-            <a:extLst>
-              <a:ext uri="{FF2B5EF4-FFF2-40B4-BE49-F238E27FC236}">
-                <a16:creationId xmlns:a16="http://schemas.microsoft.com/office/drawing/2014/main" id="{B1018812-7701-4C64-9079-4B7D21DAB831}"/>
-              </a:ext>
-            </a:extLst>
-          </p:cNvPr>
-          <p:cNvSpPr txBox="1"/>
-          <p:nvPr/>
-        </p:nvSpPr>
-        <p:spPr>
-          <a:xfrm>
-            <a:off x="5956475" y="4421462"/>
-            <a:ext cx="220343" cy="215444"/>
-          </a:xfrm>
-          <a:prstGeom prst="rect">
-            <a:avLst/>
-          </a:prstGeom>
-          <a:noFill/>
-        </p:spPr>
-        <p:txBody>
-          <a:bodyPr wrap="square" lIns="0" tIns="0" rIns="0" bIns="0" rtlCol="0">
-            <a:spAutoFit/>
-          </a:bodyPr>
-          <a:lstStyle>
-            <a:defPPr>
-              <a:defRPr lang="en-US"/>
-            </a:defPPr>
-            <a:lvl1pPr algn="r">
-              <a:defRPr sz="1400">
-                <a:solidFill>
-                  <a:srgbClr val="0070C0"/>
-                </a:solidFill>
-              </a:defRPr>
-            </a:lvl1pPr>
-          </a:lstStyle>
-          <a:p>
-            <a:r>
-              <a:rPr lang="en-US" dirty="0">
-                <a:latin typeface="Calibri"/>
-              </a:rPr>
-              <a:t>l</a:t>
-            </a:r>
           </a:p>
         </p:txBody>
       </p:sp>

</xml_diff>

<commit_message>
Edit to images for DeveloperGuide.adoc
</commit_message>
<xml_diff>
--- a/docs/diagrams/EditPaymentSequenceDiagram.pptx
+++ b/docs/diagrams/EditPaymentSequenceDiagram.pptx
@@ -197,7 +197,7 @@
           <a:p>
             <a:fld id="{62511F6D-3957-4073-A6EA-8AA084D57D2E}" type="datetimeFigureOut">
               <a:rPr lang="en-US" smtClean="0"/>
-              <a:t>10/23/2018</a:t>
+              <a:t>11/10/2018</a:t>
             </a:fld>
             <a:endParaRPr lang="en-US"/>
           </a:p>
@@ -795,7 +795,7 @@
           <a:p>
             <a:fld id="{78C97017-6FC3-485B-9764-EAC9E56C1D49}" type="datetimeFigureOut">
               <a:rPr lang="en-US" smtClean="0"/>
-              <a:t>10/23/2018</a:t>
+              <a:t>11/10/2018</a:t>
             </a:fld>
             <a:endParaRPr lang="en-US"/>
           </a:p>
@@ -963,7 +963,7 @@
           <a:p>
             <a:fld id="{78C97017-6FC3-485B-9764-EAC9E56C1D49}" type="datetimeFigureOut">
               <a:rPr lang="en-US" smtClean="0"/>
-              <a:t>10/23/2018</a:t>
+              <a:t>11/10/2018</a:t>
             </a:fld>
             <a:endParaRPr lang="en-US"/>
           </a:p>
@@ -1141,7 +1141,7 @@
           <a:p>
             <a:fld id="{78C97017-6FC3-485B-9764-EAC9E56C1D49}" type="datetimeFigureOut">
               <a:rPr lang="en-US" smtClean="0"/>
-              <a:t>10/23/2018</a:t>
+              <a:t>11/10/2018</a:t>
             </a:fld>
             <a:endParaRPr lang="en-US"/>
           </a:p>
@@ -1309,7 +1309,7 @@
           <a:p>
             <a:fld id="{78C97017-6FC3-485B-9764-EAC9E56C1D49}" type="datetimeFigureOut">
               <a:rPr lang="en-US" smtClean="0"/>
-              <a:t>10/23/2018</a:t>
+              <a:t>11/10/2018</a:t>
             </a:fld>
             <a:endParaRPr lang="en-US"/>
           </a:p>
@@ -1554,7 +1554,7 @@
           <a:p>
             <a:fld id="{78C97017-6FC3-485B-9764-EAC9E56C1D49}" type="datetimeFigureOut">
               <a:rPr lang="en-US" smtClean="0"/>
-              <a:t>10/23/2018</a:t>
+              <a:t>11/10/2018</a:t>
             </a:fld>
             <a:endParaRPr lang="en-US"/>
           </a:p>
@@ -1839,7 +1839,7 @@
           <a:p>
             <a:fld id="{78C97017-6FC3-485B-9764-EAC9E56C1D49}" type="datetimeFigureOut">
               <a:rPr lang="en-US" smtClean="0"/>
-              <a:t>10/23/2018</a:t>
+              <a:t>11/10/2018</a:t>
             </a:fld>
             <a:endParaRPr lang="en-US"/>
           </a:p>
@@ -2258,7 +2258,7 @@
           <a:p>
             <a:fld id="{78C97017-6FC3-485B-9764-EAC9E56C1D49}" type="datetimeFigureOut">
               <a:rPr lang="en-US" smtClean="0"/>
-              <a:t>10/23/2018</a:t>
+              <a:t>11/10/2018</a:t>
             </a:fld>
             <a:endParaRPr lang="en-US"/>
           </a:p>
@@ -2375,7 +2375,7 @@
           <a:p>
             <a:fld id="{78C97017-6FC3-485B-9764-EAC9E56C1D49}" type="datetimeFigureOut">
               <a:rPr lang="en-US" smtClean="0"/>
-              <a:t>10/23/2018</a:t>
+              <a:t>11/10/2018</a:t>
             </a:fld>
             <a:endParaRPr lang="en-US"/>
           </a:p>
@@ -2470,7 +2470,7 @@
           <a:p>
             <a:fld id="{78C97017-6FC3-485B-9764-EAC9E56C1D49}" type="datetimeFigureOut">
               <a:rPr lang="en-US" smtClean="0"/>
-              <a:t>10/23/2018</a:t>
+              <a:t>11/10/2018</a:t>
             </a:fld>
             <a:endParaRPr lang="en-US"/>
           </a:p>
@@ -2745,7 +2745,7 @@
           <a:p>
             <a:fld id="{78C97017-6FC3-485B-9764-EAC9E56C1D49}" type="datetimeFigureOut">
               <a:rPr lang="en-US" smtClean="0"/>
-              <a:t>10/23/2018</a:t>
+              <a:t>11/10/2018</a:t>
             </a:fld>
             <a:endParaRPr lang="en-US"/>
           </a:p>
@@ -2997,7 +2997,7 @@
           <a:p>
             <a:fld id="{78C97017-6FC3-485B-9764-EAC9E56C1D49}" type="datetimeFigureOut">
               <a:rPr lang="en-US" smtClean="0"/>
-              <a:t>10/23/2018</a:t>
+              <a:t>11/10/2018</a:t>
             </a:fld>
             <a:endParaRPr lang="en-US"/>
           </a:p>
@@ -3208,7 +3208,7 @@
           <a:p>
             <a:fld id="{78C97017-6FC3-485B-9764-EAC9E56C1D49}" type="datetimeFigureOut">
               <a:rPr lang="en-US" smtClean="0"/>
-              <a:t>10/23/2018</a:t>
+              <a:t>11/10/2018</a:t>
             </a:fld>
             <a:endParaRPr lang="en-US"/>
           </a:p>
@@ -3597,8 +3597,8 @@
         </p:nvSpPr>
         <p:spPr>
           <a:xfrm>
-            <a:off x="9208697" y="851007"/>
-            <a:ext cx="1357863" cy="5859923"/>
+            <a:off x="9513560" y="137181"/>
+            <a:ext cx="1357863" cy="6029200"/>
           </a:xfrm>
           <a:prstGeom prst="roundRect">
             <a:avLst>
@@ -3657,8 +3657,8 @@
         </p:nvSpPr>
         <p:spPr>
           <a:xfrm>
-            <a:off x="2135733" y="847633"/>
-            <a:ext cx="7012450" cy="5859923"/>
+            <a:off x="611732" y="137181"/>
+            <a:ext cx="8837067" cy="6029200"/>
           </a:xfrm>
           <a:prstGeom prst="roundRect">
             <a:avLst>
@@ -3720,7 +3720,7 @@
         </p:nvSpPr>
         <p:spPr>
           <a:xfrm>
-            <a:off x="2369046" y="1260237"/>
+            <a:off x="845046" y="482841"/>
             <a:ext cx="1455629" cy="346760"/>
           </a:xfrm>
           <a:prstGeom prst="rect">
@@ -3793,7 +3793,7 @@
         </p:nvCxnSpPr>
         <p:spPr>
           <a:xfrm>
-            <a:off x="3096860" y="1606998"/>
+            <a:off x="1572860" y="829602"/>
             <a:ext cx="0" cy="3650803"/>
           </a:xfrm>
           <a:prstGeom prst="line">
@@ -3830,8 +3830,8 @@
         </p:nvSpPr>
         <p:spPr>
           <a:xfrm>
-            <a:off x="3024850" y="1600201"/>
-            <a:ext cx="121416" cy="4860666"/>
+            <a:off x="1500850" y="912164"/>
+            <a:ext cx="133093" cy="5165899"/>
           </a:xfrm>
           <a:prstGeom prst="rect">
             <a:avLst/>
@@ -3882,8 +3882,8 @@
         </p:nvSpPr>
         <p:spPr>
           <a:xfrm>
-            <a:off x="4267200" y="1143000"/>
-            <a:ext cx="1219200" cy="467684"/>
+            <a:off x="2697186" y="357729"/>
+            <a:ext cx="1278289" cy="467684"/>
           </a:xfrm>
           <a:prstGeom prst="rect">
             <a:avLst/>
@@ -3924,11 +3924,8 @@
                 </a:solidFill>
                 <a:latin typeface="Calibri"/>
               </a:rPr>
-              <a:t>:Address</a:t>
-            </a:r>
-          </a:p>
-          <a:p>
-            <a:pPr algn="ctr"/>
+              <a:t>:</a:t>
+            </a:r>
             <a:r>
               <a:rPr lang="en-US" sz="1600" dirty="0" err="1">
                 <a:solidFill>
@@ -3936,7 +3933,7 @@
                 </a:solidFill>
                 <a:latin typeface="Calibri"/>
               </a:rPr>
-              <a:t>BookParser</a:t>
+              <a:t>TutorHelperParser</a:t>
             </a:r>
             <a:endParaRPr lang="en-SG" sz="1600" dirty="0">
               <a:solidFill>
@@ -3952,14 +3949,13 @@
           <p:cNvPr id="17" name="Straight Connector 16"/>
           <p:cNvCxnSpPr>
             <a:cxnSpLocks/>
-            <a:stCxn id="16" idx="2"/>
           </p:cNvCxnSpPr>
           <p:nvPr/>
         </p:nvCxnSpPr>
         <p:spPr>
-          <a:xfrm>
-            <a:off x="4876801" y="1610684"/>
-            <a:ext cx="3799" cy="2748594"/>
+          <a:xfrm flipH="1">
+            <a:off x="3315939" y="825413"/>
+            <a:ext cx="29544" cy="2213910"/>
           </a:xfrm>
           <a:prstGeom prst="line">
             <a:avLst/>
@@ -3995,8 +3991,8 @@
         </p:nvSpPr>
         <p:spPr>
           <a:xfrm>
-            <a:off x="4769945" y="1626318"/>
-            <a:ext cx="224682" cy="2489871"/>
+            <a:off x="3272374" y="917791"/>
+            <a:ext cx="155699" cy="1999143"/>
           </a:xfrm>
           <a:prstGeom prst="rect">
             <a:avLst/>
@@ -4047,8 +4043,8 @@
         </p:nvSpPr>
         <p:spPr>
           <a:xfrm>
-            <a:off x="6737821" y="2343862"/>
-            <a:ext cx="850026" cy="358365"/>
+            <a:off x="5213820" y="1566467"/>
+            <a:ext cx="852827" cy="317402"/>
           </a:xfrm>
           <a:prstGeom prst="rect">
             <a:avLst/>
@@ -4110,7 +4106,7 @@
         </p:nvCxnSpPr>
         <p:spPr>
           <a:xfrm>
-            <a:off x="7151253" y="2681425"/>
+            <a:off x="5627253" y="2140249"/>
             <a:ext cx="28210" cy="2686588"/>
           </a:xfrm>
           <a:prstGeom prst="line">
@@ -4147,7 +4143,7 @@
         </p:nvSpPr>
         <p:spPr>
           <a:xfrm>
-            <a:off x="7086601" y="2673980"/>
+            <a:off x="5562601" y="1896584"/>
             <a:ext cx="117613" cy="185051"/>
           </a:xfrm>
           <a:prstGeom prst="rect">
@@ -4201,7 +4197,7 @@
         </p:nvCxnSpPr>
         <p:spPr>
           <a:xfrm>
-            <a:off x="1905001" y="1978290"/>
+            <a:off x="380999" y="929330"/>
             <a:ext cx="1119851" cy="0"/>
           </a:xfrm>
           <a:prstGeom prst="straightConnector1">
@@ -4239,8 +4235,8 @@
         </p:nvCxnSpPr>
         <p:spPr>
           <a:xfrm flipV="1">
-            <a:off x="3177251" y="1902898"/>
-            <a:ext cx="1596514" cy="1"/>
+            <a:off x="1653251" y="1125503"/>
+            <a:ext cx="1619123" cy="1"/>
           </a:xfrm>
           <a:prstGeom prst="straightConnector1">
             <a:avLst/>
@@ -4275,7 +4271,7 @@
         </p:nvSpPr>
         <p:spPr>
           <a:xfrm>
-            <a:off x="1524000" y="2051160"/>
+            <a:off x="13336" y="990595"/>
             <a:ext cx="1424846" cy="369332"/>
           </a:xfrm>
           <a:prstGeom prst="rect">
@@ -4297,43 +4293,7 @@
                 </a:solidFill>
                 <a:latin typeface="Calibri"/>
               </a:rPr>
-              <a:t>execute(“paid </a:t>
-            </a:r>
-            <a:r>
-              <a:rPr lang="en-US" sz="1200" dirty="0" err="1">
-                <a:solidFill>
-                  <a:srgbClr val="0070C0"/>
-                </a:solidFill>
-                <a:latin typeface="Calibri"/>
-              </a:rPr>
-              <a:t>idx</a:t>
-            </a:r>
-            <a:r>
-              <a:rPr lang="en-US" sz="1200" dirty="0">
-                <a:solidFill>
-                  <a:srgbClr val="0070C0"/>
-                </a:solidFill>
-                <a:latin typeface="Calibri"/>
-              </a:rPr>
-              <a:t>/1 </a:t>
-            </a:r>
-            <a:r>
-              <a:rPr lang="en-US" sz="1200" dirty="0" err="1">
-                <a:solidFill>
-                  <a:srgbClr val="0070C0"/>
-                </a:solidFill>
-                <a:latin typeface="Calibri"/>
-              </a:rPr>
-              <a:t>amt</a:t>
-            </a:r>
-            <a:r>
-              <a:rPr lang="en-US" sz="1200" dirty="0">
-                <a:solidFill>
-                  <a:srgbClr val="0070C0"/>
-                </a:solidFill>
-                <a:latin typeface="Calibri"/>
-              </a:rPr>
-              <a:t>/200 m/8 y/2018”)</a:t>
+              <a:t>execute(“paid 1 200 8 2018”)</a:t>
             </a:r>
           </a:p>
         </p:txBody>
@@ -4348,7 +4308,7 @@
         </p:nvCxnSpPr>
         <p:spPr>
           <a:xfrm>
-            <a:off x="6342085" y="2551312"/>
+            <a:off x="4818085" y="1773916"/>
             <a:ext cx="383077" cy="0"/>
           </a:xfrm>
           <a:prstGeom prst="straightConnector1">
@@ -4384,7 +4344,7 @@
         </p:nvSpPr>
         <p:spPr>
           <a:xfrm>
-            <a:off x="4876801" y="4191000"/>
+            <a:off x="3352801" y="2918304"/>
             <a:ext cx="855809" cy="215444"/>
           </a:xfrm>
           <a:prstGeom prst="rect">
@@ -4428,7 +4388,7 @@
         </p:nvCxnSpPr>
         <p:spPr>
           <a:xfrm>
-            <a:off x="6350241" y="2854331"/>
+            <a:off x="4826241" y="2076935"/>
             <a:ext cx="809294" cy="2043"/>
           </a:xfrm>
           <a:prstGeom prst="straightConnector1">
@@ -4468,7 +4428,7 @@
         </p:nvCxnSpPr>
         <p:spPr>
           <a:xfrm flipV="1">
-            <a:off x="3159848" y="4109422"/>
+            <a:off x="1635848" y="2903782"/>
             <a:ext cx="1630852" cy="13156"/>
           </a:xfrm>
           <a:prstGeom prst="straightConnector1">
@@ -4508,7 +4468,7 @@
         </p:nvCxnSpPr>
         <p:spPr>
           <a:xfrm>
-            <a:off x="1828801" y="6324600"/>
+            <a:off x="327666" y="6073660"/>
             <a:ext cx="1196051" cy="0"/>
           </a:xfrm>
           <a:prstGeom prst="straightConnector1">
@@ -4546,7 +4506,7 @@
         </p:nvSpPr>
         <p:spPr>
           <a:xfrm>
-            <a:off x="9470411" y="5486400"/>
+            <a:off x="9808430" y="4945224"/>
             <a:ext cx="878029" cy="228600"/>
           </a:xfrm>
           <a:prstGeom prst="rect">
@@ -4615,7 +4575,7 @@
         </p:nvCxnSpPr>
         <p:spPr>
           <a:xfrm>
-            <a:off x="3146266" y="4429348"/>
+            <a:off x="1622266" y="3156652"/>
             <a:ext cx="3972124" cy="4742"/>
           </a:xfrm>
           <a:prstGeom prst="straightConnector1">
@@ -4651,8 +4611,8 @@
         </p:nvSpPr>
         <p:spPr>
           <a:xfrm>
-            <a:off x="7123895" y="4417678"/>
-            <a:ext cx="108529" cy="1942402"/>
+            <a:off x="5599895" y="3155974"/>
+            <a:ext cx="88177" cy="2662930"/>
           </a:xfrm>
           <a:prstGeom prst="rect">
             <a:avLst/>
@@ -4706,7 +4666,7 @@
         </p:nvCxnSpPr>
         <p:spPr>
           <a:xfrm>
-            <a:off x="9909425" y="5715001"/>
+            <a:off x="10247444" y="5173825"/>
             <a:ext cx="13180" cy="904239"/>
           </a:xfrm>
           <a:prstGeom prst="line">
@@ -4746,7 +4706,7 @@
         </p:nvSpPr>
         <p:spPr>
           <a:xfrm>
-            <a:off x="9849698" y="5769495"/>
+            <a:off x="10187717" y="5250693"/>
             <a:ext cx="119322" cy="45719"/>
           </a:xfrm>
           <a:prstGeom prst="rect">
@@ -4807,7 +4767,7 @@
         </p:nvCxnSpPr>
         <p:spPr>
           <a:xfrm>
-            <a:off x="7202960" y="5948151"/>
+            <a:off x="5678960" y="5475555"/>
             <a:ext cx="183778" cy="5627"/>
           </a:xfrm>
           <a:prstGeom prst="straightConnector1">
@@ -4840,14 +4800,13 @@
           <p:cNvPr id="76" name="Straight Arrow Connector 75"/>
           <p:cNvCxnSpPr>
             <a:cxnSpLocks/>
-            <a:endCxn id="73" idx="2"/>
           </p:cNvCxnSpPr>
           <p:nvPr/>
         </p:nvCxnSpPr>
         <p:spPr>
           <a:xfrm>
-            <a:off x="7232423" y="5792593"/>
-            <a:ext cx="2676936" cy="22620"/>
+            <a:off x="5708424" y="5274037"/>
+            <a:ext cx="4538954" cy="0"/>
           </a:xfrm>
           <a:prstGeom prst="straightConnector1">
             <a:avLst/>
@@ -4890,8 +4849,8 @@
         </p:nvCxnSpPr>
         <p:spPr>
           <a:xfrm flipV="1">
-            <a:off x="2749771" y="6360080"/>
-            <a:ext cx="4428389" cy="2"/>
+            <a:off x="1653251" y="5818904"/>
+            <a:ext cx="3990733" cy="31450"/>
           </a:xfrm>
           <a:prstGeom prst="straightConnector1">
             <a:avLst/>
@@ -4928,8 +4887,8 @@
         </p:nvSpPr>
         <p:spPr>
           <a:xfrm>
-            <a:off x="7588715" y="5466040"/>
-            <a:ext cx="1424846" cy="123111"/>
+            <a:off x="6136076" y="4927294"/>
+            <a:ext cx="1800153" cy="123111"/>
           </a:xfrm>
           <a:prstGeom prst="rect">
             <a:avLst/>
@@ -4960,7 +4919,7 @@
                 </a:solidFill>
                 <a:latin typeface="Calibri"/>
               </a:rPr>
-              <a:t>updatePerson</a:t>
+              <a:t>updateStudentInternalField</a:t>
             </a:r>
             <a:r>
               <a:rPr lang="en-US" sz="800" dirty="0">
@@ -4969,7 +4928,7 @@
                 </a:solidFill>
                 <a:latin typeface="Calibri"/>
               </a:rPr>
-              <a:t>(edited)</a:t>
+              <a:t>(t, edited)</a:t>
             </a:r>
           </a:p>
         </p:txBody>
@@ -4982,8 +4941,8 @@
         </p:nvSpPr>
         <p:spPr>
           <a:xfrm>
-            <a:off x="5076696" y="2525773"/>
-            <a:ext cx="884073" cy="553998"/>
+            <a:off x="3552696" y="1620361"/>
+            <a:ext cx="884073" cy="369332"/>
           </a:xfrm>
           <a:prstGeom prst="rect">
             <a:avLst/>
@@ -5011,31 +4970,7 @@
               <a:rPr lang="en-US" sz="1200" dirty="0">
                 <a:latin typeface="Calibri"/>
               </a:rPr>
-              <a:t>parse(“</a:t>
-            </a:r>
-            <a:r>
-              <a:rPr lang="en-US" sz="1200" dirty="0" err="1">
-                <a:latin typeface="Calibri"/>
-              </a:rPr>
-              <a:t>idx</a:t>
-            </a:r>
-            <a:r>
-              <a:rPr lang="en-US" sz="1200" dirty="0">
-                <a:latin typeface="Calibri"/>
-              </a:rPr>
-              <a:t>/1 </a:t>
-            </a:r>
-            <a:r>
-              <a:rPr lang="en-US" sz="1200" dirty="0" err="1">
-                <a:latin typeface="Calibri"/>
-              </a:rPr>
-              <a:t>amt</a:t>
-            </a:r>
-            <a:r>
-              <a:rPr lang="en-US" sz="1200" dirty="0">
-                <a:latin typeface="Calibri"/>
-              </a:rPr>
-              <a:t>/200 m/8 y/2018”)</a:t>
+              <a:t>parse(“1 200 82018”)</a:t>
             </a:r>
           </a:p>
         </p:txBody>
@@ -5048,8 +4983,8 @@
         </p:nvSpPr>
         <p:spPr>
           <a:xfrm>
-            <a:off x="3266982" y="1676401"/>
-            <a:ext cx="1424846" cy="646331"/>
+            <a:off x="1742982" y="899005"/>
+            <a:ext cx="1424846" cy="430887"/>
           </a:xfrm>
           <a:prstGeom prst="rect">
             <a:avLst/>
@@ -5077,31 +5012,7 @@
               <a:rPr lang="en-US" dirty="0">
                 <a:latin typeface="Calibri"/>
               </a:rPr>
-              <a:t>parse (“paid </a:t>
-            </a:r>
-            <a:r>
-              <a:rPr lang="en-US" dirty="0" err="1">
-                <a:latin typeface="Calibri"/>
-              </a:rPr>
-              <a:t>idx</a:t>
-            </a:r>
-            <a:r>
-              <a:rPr lang="en-US" dirty="0">
-                <a:latin typeface="Calibri"/>
-              </a:rPr>
-              <a:t>/1 </a:t>
-            </a:r>
-            <a:r>
-              <a:rPr lang="en-US" dirty="0" err="1">
-                <a:latin typeface="Calibri"/>
-              </a:rPr>
-              <a:t>amt</a:t>
-            </a:r>
-            <a:r>
-              <a:rPr lang="en-US" dirty="0">
-                <a:latin typeface="Calibri"/>
-              </a:rPr>
-              <a:t>/200 m/8 y/2018”)</a:t>
+              <a:t>parse (“paid 1 200 8 2018”)</a:t>
             </a:r>
           </a:p>
         </p:txBody>
@@ -5114,7 +5025,7 @@
         </p:nvSpPr>
         <p:spPr>
           <a:xfrm>
-            <a:off x="5864137" y="6093523"/>
+            <a:off x="4340137" y="5552347"/>
             <a:ext cx="621216" cy="215444"/>
           </a:xfrm>
           <a:prstGeom prst="rect">
@@ -5156,7 +5067,7 @@
         </p:nvSpPr>
         <p:spPr>
           <a:xfrm>
-            <a:off x="2123983" y="6071888"/>
+            <a:off x="622848" y="5820948"/>
             <a:ext cx="762000" cy="215444"/>
           </a:xfrm>
           <a:prstGeom prst="rect">
@@ -5198,7 +5109,7 @@
         </p:nvSpPr>
         <p:spPr>
           <a:xfrm>
-            <a:off x="7386738" y="5837588"/>
+            <a:off x="5862738" y="5364992"/>
             <a:ext cx="1676400" cy="232379"/>
           </a:xfrm>
           <a:prstGeom prst="rect">
@@ -5240,16 +5151,7 @@
                 </a:solidFill>
                 <a:latin typeface="Calibri"/>
               </a:rPr>
-              <a:t>result:Command</a:t>
-            </a:r>
-            <a:r>
-              <a:rPr lang="en-US" sz="1200" dirty="0">
-                <a:solidFill>
-                  <a:prstClr val="white"/>
-                </a:solidFill>
-                <a:latin typeface="Calibri"/>
-              </a:rPr>
-              <a:t> Result</a:t>
+              <a:t>result:CommandResult</a:t>
             </a:r>
             <a:endParaRPr lang="en-SG" sz="1200" dirty="0">
               <a:solidFill>
@@ -5268,8 +5170,8 @@
         </p:nvSpPr>
         <p:spPr>
           <a:xfrm>
-            <a:off x="8148738" y="6078283"/>
-            <a:ext cx="152400" cy="171376"/>
+            <a:off x="6624738" y="5610087"/>
+            <a:ext cx="152400" cy="113636"/>
           </a:xfrm>
           <a:prstGeom prst="rect">
             <a:avLst/>
@@ -5322,7 +5224,7 @@
         </p:nvCxnSpPr>
         <p:spPr>
           <a:xfrm>
-            <a:off x="7237928" y="6260524"/>
+            <a:off x="5713928" y="5719348"/>
             <a:ext cx="910811" cy="0"/>
           </a:xfrm>
           <a:prstGeom prst="straightConnector1">
@@ -5360,7 +5262,7 @@
         </p:nvSpPr>
         <p:spPr>
           <a:xfrm>
-            <a:off x="4197846" y="3893978"/>
+            <a:off x="2673846" y="2688338"/>
             <a:ext cx="220343" cy="215444"/>
           </a:xfrm>
           <a:prstGeom prst="rect">
@@ -5402,7 +5304,7 @@
         </p:nvSpPr>
         <p:spPr>
           <a:xfrm>
-            <a:off x="5308400" y="1752601"/>
+            <a:off x="3784400" y="975205"/>
             <a:ext cx="1778201" cy="432035"/>
           </a:xfrm>
           <a:prstGeom prst="rect">
@@ -5492,8 +5394,8 @@
         </p:nvCxnSpPr>
         <p:spPr>
           <a:xfrm>
-            <a:off x="4967981" y="2539328"/>
-            <a:ext cx="1176315" cy="0"/>
+            <a:off x="3429001" y="1633916"/>
+            <a:ext cx="1191295" cy="0"/>
           </a:xfrm>
           <a:prstGeom prst="straightConnector1">
             <a:avLst/>
@@ -5526,7 +5428,7 @@
         </p:nvSpPr>
         <p:spPr>
           <a:xfrm>
-            <a:off x="6136242" y="2183423"/>
+            <a:off x="4612242" y="1406027"/>
             <a:ext cx="205843" cy="123165"/>
           </a:xfrm>
           <a:prstGeom prst="rect">
@@ -5580,8 +5482,8 @@
         </p:nvCxnSpPr>
         <p:spPr>
           <a:xfrm>
-            <a:off x="6239288" y="2175562"/>
-            <a:ext cx="3799" cy="2135303"/>
+            <a:off x="4715288" y="1408834"/>
+            <a:ext cx="0" cy="1657839"/>
           </a:xfrm>
           <a:prstGeom prst="line">
             <a:avLst/>
@@ -5617,8 +5519,8 @@
         </p:nvSpPr>
         <p:spPr>
           <a:xfrm>
-            <a:off x="6144592" y="2539330"/>
-            <a:ext cx="201395" cy="1575470"/>
+            <a:off x="4620592" y="1620202"/>
+            <a:ext cx="198331" cy="1290158"/>
           </a:xfrm>
           <a:prstGeom prst="rect">
             <a:avLst/>
@@ -5671,7 +5573,7 @@
         </p:nvCxnSpPr>
         <p:spPr>
           <a:xfrm>
-            <a:off x="4983520" y="4109061"/>
+            <a:off x="3459520" y="2903421"/>
             <a:ext cx="1165315" cy="1"/>
           </a:xfrm>
           <a:prstGeom prst="straightConnector1">
@@ -5711,7 +5613,7 @@
         </p:nvCxnSpPr>
         <p:spPr>
           <a:xfrm flipV="1">
-            <a:off x="4953001" y="2019751"/>
+            <a:off x="3429001" y="1242355"/>
             <a:ext cx="358137" cy="3411"/>
           </a:xfrm>
           <a:prstGeom prst="straightConnector1">
@@ -5749,8 +5651,8 @@
         </p:nvCxnSpPr>
         <p:spPr>
           <a:xfrm>
-            <a:off x="4983519" y="2298726"/>
-            <a:ext cx="1152846" cy="0"/>
+            <a:off x="3439965" y="1521330"/>
+            <a:ext cx="1172400" cy="0"/>
           </a:xfrm>
           <a:prstGeom prst="straightConnector1">
             <a:avLst/>
@@ -5787,7 +5689,7 @@
         </p:nvSpPr>
         <p:spPr>
           <a:xfrm>
-            <a:off x="6015902" y="4156741"/>
+            <a:off x="4500623" y="2916393"/>
             <a:ext cx="463460" cy="261610"/>
           </a:xfrm>
           <a:prstGeom prst="rect">
@@ -5827,7 +5729,7 @@
         </p:nvSpPr>
         <p:spPr>
           <a:xfrm>
-            <a:off x="6743907" y="2942828"/>
+            <a:off x="5219907" y="2165432"/>
             <a:ext cx="850026" cy="335501"/>
           </a:xfrm>
           <a:prstGeom prst="rect">
@@ -5906,8 +5808,8 @@
         </p:nvSpPr>
         <p:spPr>
           <a:xfrm>
-            <a:off x="7108920" y="3285313"/>
-            <a:ext cx="125330" cy="847461"/>
+            <a:off x="5584920" y="2591737"/>
+            <a:ext cx="100601" cy="318257"/>
           </a:xfrm>
           <a:prstGeom prst="rect">
             <a:avLst/>
@@ -5961,14 +5863,13 @@
           </p:cNvPr>
           <p:cNvCxnSpPr>
             <a:cxnSpLocks/>
-            <a:endCxn id="74" idx="1"/>
           </p:cNvCxnSpPr>
           <p:nvPr/>
         </p:nvCxnSpPr>
         <p:spPr>
-          <a:xfrm>
-            <a:off x="6369315" y="3108444"/>
-            <a:ext cx="374592" cy="2134"/>
+          <a:xfrm flipV="1">
+            <a:off x="4725418" y="2328883"/>
+            <a:ext cx="497670" cy="3325"/>
           </a:xfrm>
           <a:prstGeom prst="straightConnector1">
             <a:avLst/>
@@ -6009,7 +5910,7 @@
         </p:nvSpPr>
         <p:spPr>
           <a:xfrm>
-            <a:off x="6103945" y="3136520"/>
+            <a:off x="4426913" y="2319867"/>
             <a:ext cx="621216" cy="215444"/>
           </a:xfrm>
           <a:prstGeom prst="rect">
@@ -6060,8 +5961,8 @@
         </p:nvCxnSpPr>
         <p:spPr>
           <a:xfrm flipV="1">
-            <a:off x="7202960" y="5600700"/>
-            <a:ext cx="2267450" cy="13998"/>
+            <a:off x="5678960" y="5059524"/>
+            <a:ext cx="4129470" cy="22620"/>
           </a:xfrm>
           <a:prstGeom prst="straightConnector1">
             <a:avLst/>
@@ -6104,7 +6005,7 @@
         </p:nvCxnSpPr>
         <p:spPr>
           <a:xfrm>
-            <a:off x="6361669" y="4109060"/>
+            <a:off x="4837669" y="2903420"/>
             <a:ext cx="733069" cy="6940"/>
           </a:xfrm>
           <a:prstGeom prst="straightConnector1">
@@ -6148,7 +6049,7 @@
         </p:nvSpPr>
         <p:spPr>
           <a:xfrm>
-            <a:off x="8161050" y="4362517"/>
+            <a:off x="6637050" y="3089821"/>
             <a:ext cx="926621" cy="230693"/>
           </a:xfrm>
           <a:prstGeom prst="rect">
@@ -6190,7 +6091,7 @@
                 </a:solidFill>
                 <a:latin typeface="Calibri"/>
               </a:rPr>
-              <a:t>t:Person</a:t>
+              <a:t>t:Student</a:t>
             </a:r>
             <a:endParaRPr lang="en-SG" sz="1200" dirty="0">
               <a:solidFill>
@@ -6215,7 +6116,7 @@
         </p:nvSpPr>
         <p:spPr>
           <a:xfrm>
-            <a:off x="8529165" y="4593752"/>
+            <a:off x="7005165" y="3321056"/>
             <a:ext cx="144923" cy="102175"/>
           </a:xfrm>
           <a:prstGeom prst="rect">
@@ -6270,14 +6171,13 @@
           </p:cNvPr>
           <p:cNvCxnSpPr>
             <a:cxnSpLocks/>
-            <a:endCxn id="110" idx="1"/>
           </p:cNvCxnSpPr>
           <p:nvPr/>
         </p:nvCxnSpPr>
         <p:spPr>
           <a:xfrm>
-            <a:off x="7235979" y="4476947"/>
-            <a:ext cx="925070" cy="916"/>
+            <a:off x="5635220" y="3197778"/>
+            <a:ext cx="989518" cy="1090"/>
           </a:xfrm>
           <a:prstGeom prst="straightConnector1">
             <a:avLst/>
@@ -6318,7 +6218,7 @@
         </p:nvSpPr>
         <p:spPr>
           <a:xfrm>
-            <a:off x="6989880" y="4308655"/>
+            <a:off x="5465880" y="3035959"/>
             <a:ext cx="1150818" cy="107722"/>
           </a:xfrm>
           <a:prstGeom prst="rect">
@@ -6375,8 +6275,8 @@
         </p:nvCxnSpPr>
         <p:spPr>
           <a:xfrm>
-            <a:off x="7244116" y="4692004"/>
-            <a:ext cx="1357510" cy="3923"/>
+            <a:off x="5685521" y="3418323"/>
+            <a:ext cx="1392106" cy="4908"/>
           </a:xfrm>
           <a:prstGeom prst="straightConnector1">
             <a:avLst/>
@@ -6419,8 +6319,8 @@
         </p:nvSpPr>
         <p:spPr>
           <a:xfrm>
-            <a:off x="8548015" y="5077292"/>
-            <a:ext cx="135553" cy="327233"/>
+            <a:off x="7024015" y="4723781"/>
+            <a:ext cx="187553" cy="102797"/>
           </a:xfrm>
           <a:prstGeom prst="rect">
             <a:avLst/>
@@ -6479,9 +6379,9 @@
           <p:nvPr/>
         </p:nvCxnSpPr>
         <p:spPr>
-          <a:xfrm flipV="1">
-            <a:off x="7235979" y="4948093"/>
-            <a:ext cx="925070" cy="4908"/>
+          <a:xfrm>
+            <a:off x="5655463" y="4620278"/>
+            <a:ext cx="981587" cy="0"/>
           </a:xfrm>
           <a:prstGeom prst="straightConnector1">
             <a:avLst/>
@@ -6525,8 +6425,8 @@
         </p:nvCxnSpPr>
         <p:spPr>
           <a:xfrm>
-            <a:off x="7244117" y="5404524"/>
-            <a:ext cx="1371675" cy="0"/>
+            <a:off x="5667212" y="4826578"/>
+            <a:ext cx="1450580" cy="0"/>
           </a:xfrm>
           <a:prstGeom prst="straightConnector1">
             <a:avLst/>
@@ -6569,8 +6469,8 @@
         </p:nvSpPr>
         <p:spPr>
           <a:xfrm>
-            <a:off x="8161050" y="4832747"/>
-            <a:ext cx="926621" cy="230693"/>
+            <a:off x="6637050" y="4504931"/>
+            <a:ext cx="989046" cy="230693"/>
           </a:xfrm>
           <a:prstGeom prst="rect">
             <a:avLst/>
@@ -6611,7 +6511,7 @@
                 </a:solidFill>
                 <a:latin typeface="Calibri"/>
               </a:rPr>
-              <a:t>edited:Person</a:t>
+              <a:t>edited:Student</a:t>
             </a:r>
             <a:endParaRPr lang="en-SG" sz="1000" dirty="0">
               <a:solidFill>
@@ -6619,6 +6519,767 @@
               </a:solidFill>
               <a:latin typeface="Calibri"/>
             </a:endParaRPr>
+          </a:p>
+        </p:txBody>
+      </p:sp>
+      <p:cxnSp>
+        <p:nvCxnSpPr>
+          <p:cNvPr id="89" name="Straight Connector 88">
+            <a:extLst>
+              <a:ext uri="{FF2B5EF4-FFF2-40B4-BE49-F238E27FC236}">
+                <a16:creationId xmlns:a16="http://schemas.microsoft.com/office/drawing/2014/main" id="{3C52FF72-1AFF-4CFD-B58A-8AA853F51E06}"/>
+              </a:ext>
+            </a:extLst>
+          </p:cNvPr>
+          <p:cNvCxnSpPr>
+            <a:cxnSpLocks/>
+          </p:cNvCxnSpPr>
+          <p:nvPr/>
+        </p:nvCxnSpPr>
+        <p:spPr>
+          <a:xfrm>
+            <a:off x="7077627" y="3299962"/>
+            <a:ext cx="0" cy="728478"/>
+          </a:xfrm>
+          <a:prstGeom prst="line">
+            <a:avLst/>
+          </a:prstGeom>
+          <a:ln w="19050">
+            <a:solidFill>
+              <a:srgbClr val="0070C0"/>
+            </a:solidFill>
+            <a:prstDash val="sysDash"/>
+          </a:ln>
+          <a:effectLst/>
+        </p:spPr>
+        <p:style>
+          <a:lnRef idx="1">
+            <a:schemeClr val="accent1"/>
+          </a:lnRef>
+          <a:fillRef idx="2">
+            <a:schemeClr val="accent1"/>
+          </a:fillRef>
+          <a:effectRef idx="1">
+            <a:schemeClr val="accent1"/>
+          </a:effectRef>
+          <a:fontRef idx="minor">
+            <a:schemeClr val="dk1"/>
+          </a:fontRef>
+        </p:style>
+      </p:cxnSp>
+      <p:sp>
+        <p:nvSpPr>
+          <p:cNvPr id="91" name="Rectangle 90">
+            <a:extLst>
+              <a:ext uri="{FF2B5EF4-FFF2-40B4-BE49-F238E27FC236}">
+                <a16:creationId xmlns:a16="http://schemas.microsoft.com/office/drawing/2014/main" id="{27739D36-84D0-4EC7-99BB-3DC63996C25E}"/>
+              </a:ext>
+            </a:extLst>
+          </p:cNvPr>
+          <p:cNvSpPr/>
+          <p:nvPr/>
+        </p:nvSpPr>
+        <p:spPr>
+          <a:xfrm>
+            <a:off x="7014536" y="3533248"/>
+            <a:ext cx="124308" cy="402673"/>
+          </a:xfrm>
+          <a:prstGeom prst="rect">
+            <a:avLst/>
+          </a:prstGeom>
+          <a:solidFill>
+            <a:srgbClr val="0070C0"/>
+          </a:solidFill>
+          <a:ln>
+            <a:solidFill>
+              <a:srgbClr val="0070C0"/>
+            </a:solidFill>
+          </a:ln>
+          <a:effectLst/>
+        </p:spPr>
+        <p:style>
+          <a:lnRef idx="1">
+            <a:schemeClr val="accent3"/>
+          </a:lnRef>
+          <a:fillRef idx="2">
+            <a:schemeClr val="accent3"/>
+          </a:fillRef>
+          <a:effectRef idx="1">
+            <a:schemeClr val="accent3"/>
+          </a:effectRef>
+          <a:fontRef idx="minor">
+            <a:schemeClr val="dk1"/>
+          </a:fontRef>
+        </p:style>
+        <p:txBody>
+          <a:bodyPr rtlCol="0" anchor="ctr"/>
+          <a:lstStyle/>
+          <a:p>
+            <a:pPr algn="ctr"/>
+            <a:endParaRPr lang="en-SG" sz="1400">
+              <a:solidFill>
+                <a:prstClr val="black"/>
+              </a:solidFill>
+              <a:latin typeface="Calibri"/>
+            </a:endParaRPr>
+          </a:p>
+        </p:txBody>
+      </p:sp>
+      <p:cxnSp>
+        <p:nvCxnSpPr>
+          <p:cNvPr id="94" name="Straight Arrow Connector 93">
+            <a:extLst>
+              <a:ext uri="{FF2B5EF4-FFF2-40B4-BE49-F238E27FC236}">
+                <a16:creationId xmlns:a16="http://schemas.microsoft.com/office/drawing/2014/main" id="{42384EDF-EAEC-4D9B-B300-246D17B69F64}"/>
+              </a:ext>
+            </a:extLst>
+          </p:cNvPr>
+          <p:cNvCxnSpPr>
+            <a:cxnSpLocks/>
+          </p:cNvCxnSpPr>
+          <p:nvPr/>
+        </p:nvCxnSpPr>
+        <p:spPr>
+          <a:xfrm>
+            <a:off x="5673586" y="3925537"/>
+            <a:ext cx="1392106" cy="4908"/>
+          </a:xfrm>
+          <a:prstGeom prst="straightConnector1">
+            <a:avLst/>
+          </a:prstGeom>
+          <a:ln w="19050">
+            <a:solidFill>
+              <a:srgbClr val="0070C0"/>
+            </a:solidFill>
+            <a:prstDash val="sysDash"/>
+            <a:headEnd type="arrow" w="med" len="med"/>
+            <a:tailEnd type="none" w="med" len="med"/>
+          </a:ln>
+        </p:spPr>
+        <p:style>
+          <a:lnRef idx="1">
+            <a:schemeClr val="accent1"/>
+          </a:lnRef>
+          <a:fillRef idx="0">
+            <a:schemeClr val="accent1"/>
+          </a:fillRef>
+          <a:effectRef idx="0">
+            <a:schemeClr val="accent1"/>
+          </a:effectRef>
+          <a:fontRef idx="minor">
+            <a:schemeClr val="tx1"/>
+          </a:fontRef>
+        </p:style>
+      </p:cxnSp>
+      <p:cxnSp>
+        <p:nvCxnSpPr>
+          <p:cNvPr id="96" name="Straight Arrow Connector 95">
+            <a:extLst>
+              <a:ext uri="{FF2B5EF4-FFF2-40B4-BE49-F238E27FC236}">
+                <a16:creationId xmlns:a16="http://schemas.microsoft.com/office/drawing/2014/main" id="{5C148ACD-B02E-4E4C-A941-E725C5C105DF}"/>
+              </a:ext>
+            </a:extLst>
+          </p:cNvPr>
+          <p:cNvCxnSpPr>
+            <a:cxnSpLocks/>
+          </p:cNvCxnSpPr>
+          <p:nvPr/>
+        </p:nvCxnSpPr>
+        <p:spPr>
+          <a:xfrm>
+            <a:off x="7140720" y="3602424"/>
+            <a:ext cx="591040" cy="141"/>
+          </a:xfrm>
+          <a:prstGeom prst="straightConnector1">
+            <a:avLst/>
+          </a:prstGeom>
+          <a:ln w="19050">
+            <a:solidFill>
+              <a:srgbClr val="0070C0"/>
+            </a:solidFill>
+            <a:tailEnd type="arrow"/>
+          </a:ln>
+        </p:spPr>
+        <p:style>
+          <a:lnRef idx="1">
+            <a:schemeClr val="accent1"/>
+          </a:lnRef>
+          <a:fillRef idx="0">
+            <a:schemeClr val="accent1"/>
+          </a:fillRef>
+          <a:effectRef idx="0">
+            <a:schemeClr val="accent1"/>
+          </a:effectRef>
+          <a:fontRef idx="minor">
+            <a:schemeClr val="tx1"/>
+          </a:fontRef>
+        </p:style>
+      </p:cxnSp>
+      <p:cxnSp>
+        <p:nvCxnSpPr>
+          <p:cNvPr id="97" name="Straight Arrow Connector 96">
+            <a:extLst>
+              <a:ext uri="{FF2B5EF4-FFF2-40B4-BE49-F238E27FC236}">
+                <a16:creationId xmlns:a16="http://schemas.microsoft.com/office/drawing/2014/main" id="{19ADF5F6-152B-4A86-9E88-3F66FD422235}"/>
+              </a:ext>
+            </a:extLst>
+          </p:cNvPr>
+          <p:cNvCxnSpPr>
+            <a:cxnSpLocks/>
+          </p:cNvCxnSpPr>
+          <p:nvPr/>
+        </p:nvCxnSpPr>
+        <p:spPr>
+          <a:xfrm>
+            <a:off x="7138843" y="3820487"/>
+            <a:ext cx="972781" cy="0"/>
+          </a:xfrm>
+          <a:prstGeom prst="straightConnector1">
+            <a:avLst/>
+          </a:prstGeom>
+          <a:ln w="19050">
+            <a:solidFill>
+              <a:srgbClr val="0070C0"/>
+            </a:solidFill>
+            <a:prstDash val="sysDash"/>
+            <a:headEnd type="arrow" w="med" len="med"/>
+            <a:tailEnd type="none" w="med" len="med"/>
+          </a:ln>
+        </p:spPr>
+        <p:style>
+          <a:lnRef idx="1">
+            <a:schemeClr val="accent1"/>
+          </a:lnRef>
+          <a:fillRef idx="0">
+            <a:schemeClr val="accent1"/>
+          </a:fillRef>
+          <a:effectRef idx="0">
+            <a:schemeClr val="accent1"/>
+          </a:effectRef>
+          <a:fontRef idx="minor">
+            <a:schemeClr val="tx1"/>
+          </a:fontRef>
+        </p:style>
+      </p:cxnSp>
+      <p:sp>
+        <p:nvSpPr>
+          <p:cNvPr id="98" name="TextBox 97">
+            <a:extLst>
+              <a:ext uri="{FF2B5EF4-FFF2-40B4-BE49-F238E27FC236}">
+                <a16:creationId xmlns:a16="http://schemas.microsoft.com/office/drawing/2014/main" id="{6BF14BD3-52B4-486D-8DBE-D7B6178D4C1A}"/>
+              </a:ext>
+            </a:extLst>
+          </p:cNvPr>
+          <p:cNvSpPr txBox="1"/>
+          <p:nvPr/>
+        </p:nvSpPr>
+        <p:spPr>
+          <a:xfrm>
+            <a:off x="6584159" y="3435937"/>
+            <a:ext cx="1150818" cy="107722"/>
+          </a:xfrm>
+          <a:prstGeom prst="rect">
+            <a:avLst/>
+          </a:prstGeom>
+          <a:noFill/>
+        </p:spPr>
+        <p:txBody>
+          <a:bodyPr wrap="square" lIns="0" tIns="0" rIns="0" bIns="0" rtlCol="0">
+            <a:spAutoFit/>
+          </a:bodyPr>
+          <a:lstStyle>
+            <a:defPPr>
+              <a:defRPr lang="en-US"/>
+            </a:defPPr>
+            <a:lvl1pPr algn="r">
+              <a:defRPr sz="1400">
+                <a:solidFill>
+                  <a:srgbClr val="0070C0"/>
+                </a:solidFill>
+              </a:defRPr>
+            </a:lvl1pPr>
+          </a:lstStyle>
+          <a:p>
+            <a:r>
+              <a:rPr lang="en-US" sz="700" dirty="0" err="1">
+                <a:latin typeface="Calibri"/>
+              </a:rPr>
+              <a:t>getPayments</a:t>
+            </a:r>
+            <a:r>
+              <a:rPr lang="en-US" sz="700" dirty="0">
+                <a:latin typeface="Calibri"/>
+              </a:rPr>
+              <a:t>()</a:t>
+            </a:r>
+          </a:p>
+        </p:txBody>
+      </p:sp>
+      <p:sp>
+        <p:nvSpPr>
+          <p:cNvPr id="99" name="Rectangle 62">
+            <a:extLst>
+              <a:ext uri="{FF2B5EF4-FFF2-40B4-BE49-F238E27FC236}">
+                <a16:creationId xmlns:a16="http://schemas.microsoft.com/office/drawing/2014/main" id="{FBE52BE1-83B1-4044-832A-21CFA28B823E}"/>
+              </a:ext>
+            </a:extLst>
+          </p:cNvPr>
+          <p:cNvSpPr/>
+          <p:nvPr/>
+        </p:nvSpPr>
+        <p:spPr>
+          <a:xfrm>
+            <a:off x="7743509" y="3487077"/>
+            <a:ext cx="926621" cy="230693"/>
+          </a:xfrm>
+          <a:prstGeom prst="rect">
+            <a:avLst/>
+          </a:prstGeom>
+          <a:solidFill>
+            <a:srgbClr val="0070C0"/>
+          </a:solidFill>
+          <a:ln w="19050">
+            <a:solidFill>
+              <a:srgbClr val="0070C0"/>
+            </a:solidFill>
+          </a:ln>
+          <a:effectLst/>
+        </p:spPr>
+        <p:style>
+          <a:lnRef idx="1">
+            <a:schemeClr val="accent2"/>
+          </a:lnRef>
+          <a:fillRef idx="2">
+            <a:schemeClr val="accent2"/>
+          </a:fillRef>
+          <a:effectRef idx="1">
+            <a:schemeClr val="accent2"/>
+          </a:effectRef>
+          <a:fontRef idx="minor">
+            <a:schemeClr val="dk1"/>
+          </a:fontRef>
+        </p:style>
+        <p:txBody>
+          <a:bodyPr rtlCol="0" anchor="ctr"/>
+          <a:lstStyle/>
+          <a:p>
+            <a:pPr algn="ctr"/>
+            <a:r>
+              <a:rPr lang="en-US" sz="800" dirty="0">
+                <a:solidFill>
+                  <a:prstClr val="white"/>
+                </a:solidFill>
+                <a:latin typeface="Calibri"/>
+              </a:rPr>
+              <a:t>l:List&lt;Payments&gt;</a:t>
+            </a:r>
+            <a:endParaRPr lang="en-SG" sz="800" dirty="0">
+              <a:solidFill>
+                <a:prstClr val="white"/>
+              </a:solidFill>
+              <a:latin typeface="Calibri"/>
+            </a:endParaRPr>
+          </a:p>
+        </p:txBody>
+      </p:sp>
+      <p:sp>
+        <p:nvSpPr>
+          <p:cNvPr id="100" name="Rectangle 99">
+            <a:extLst>
+              <a:ext uri="{FF2B5EF4-FFF2-40B4-BE49-F238E27FC236}">
+                <a16:creationId xmlns:a16="http://schemas.microsoft.com/office/drawing/2014/main" id="{D229B755-5805-4A80-91B2-FEDEE15C495C}"/>
+              </a:ext>
+            </a:extLst>
+          </p:cNvPr>
+          <p:cNvSpPr/>
+          <p:nvPr/>
+        </p:nvSpPr>
+        <p:spPr>
+          <a:xfrm>
+            <a:off x="8111624" y="3718312"/>
+            <a:ext cx="144923" cy="102175"/>
+          </a:xfrm>
+          <a:prstGeom prst="rect">
+            <a:avLst/>
+          </a:prstGeom>
+          <a:solidFill>
+            <a:srgbClr val="0070C0"/>
+          </a:solidFill>
+          <a:ln>
+            <a:solidFill>
+              <a:srgbClr val="0070C0"/>
+            </a:solidFill>
+          </a:ln>
+          <a:effectLst/>
+        </p:spPr>
+        <p:style>
+          <a:lnRef idx="1">
+            <a:schemeClr val="accent3"/>
+          </a:lnRef>
+          <a:fillRef idx="2">
+            <a:schemeClr val="accent3"/>
+          </a:fillRef>
+          <a:effectRef idx="1">
+            <a:schemeClr val="accent3"/>
+          </a:effectRef>
+          <a:fontRef idx="minor">
+            <a:schemeClr val="dk1"/>
+          </a:fontRef>
+        </p:style>
+        <p:txBody>
+          <a:bodyPr rtlCol="0" anchor="ctr"/>
+          <a:lstStyle/>
+          <a:p>
+            <a:pPr algn="ctr"/>
+            <a:endParaRPr lang="en-SG" sz="1400">
+              <a:solidFill>
+                <a:prstClr val="black"/>
+              </a:solidFill>
+              <a:latin typeface="Calibri"/>
+            </a:endParaRPr>
+          </a:p>
+        </p:txBody>
+      </p:sp>
+      <p:sp>
+        <p:nvSpPr>
+          <p:cNvPr id="101" name="TextBox 100">
+            <a:extLst>
+              <a:ext uri="{FF2B5EF4-FFF2-40B4-BE49-F238E27FC236}">
+                <a16:creationId xmlns:a16="http://schemas.microsoft.com/office/drawing/2014/main" id="{4FFDA7D7-5B61-4979-83C4-DE0F52D01109}"/>
+              </a:ext>
+            </a:extLst>
+          </p:cNvPr>
+          <p:cNvSpPr txBox="1"/>
+          <p:nvPr/>
+        </p:nvSpPr>
+        <p:spPr>
+          <a:xfrm>
+            <a:off x="6197815" y="3712105"/>
+            <a:ext cx="220343" cy="215444"/>
+          </a:xfrm>
+          <a:prstGeom prst="rect">
+            <a:avLst/>
+          </a:prstGeom>
+          <a:noFill/>
+        </p:spPr>
+        <p:txBody>
+          <a:bodyPr wrap="square" lIns="0" tIns="0" rIns="0" bIns="0" rtlCol="0">
+            <a:spAutoFit/>
+          </a:bodyPr>
+          <a:lstStyle>
+            <a:defPPr>
+              <a:defRPr lang="en-US"/>
+            </a:defPPr>
+            <a:lvl1pPr algn="r">
+              <a:defRPr sz="1400">
+                <a:solidFill>
+                  <a:srgbClr val="0070C0"/>
+                </a:solidFill>
+              </a:defRPr>
+            </a:lvl1pPr>
+          </a:lstStyle>
+          <a:p>
+            <a:r>
+              <a:rPr lang="en-US" dirty="0">
+                <a:latin typeface="Calibri"/>
+              </a:rPr>
+              <a:t>l</a:t>
+            </a:r>
+          </a:p>
+        </p:txBody>
+      </p:sp>
+      <p:cxnSp>
+        <p:nvCxnSpPr>
+          <p:cNvPr id="102" name="Straight Connector 101">
+            <a:extLst>
+              <a:ext uri="{FF2B5EF4-FFF2-40B4-BE49-F238E27FC236}">
+                <a16:creationId xmlns:a16="http://schemas.microsoft.com/office/drawing/2014/main" id="{347EB980-93F3-4661-BFCE-7572AC377838}"/>
+              </a:ext>
+            </a:extLst>
+          </p:cNvPr>
+          <p:cNvCxnSpPr>
+            <a:cxnSpLocks/>
+          </p:cNvCxnSpPr>
+          <p:nvPr/>
+        </p:nvCxnSpPr>
+        <p:spPr>
+          <a:xfrm>
+            <a:off x="8180668" y="3640396"/>
+            <a:ext cx="0" cy="723324"/>
+          </a:xfrm>
+          <a:prstGeom prst="line">
+            <a:avLst/>
+          </a:prstGeom>
+          <a:ln w="19050">
+            <a:solidFill>
+              <a:srgbClr val="0070C0"/>
+            </a:solidFill>
+            <a:prstDash val="sysDash"/>
+          </a:ln>
+          <a:effectLst/>
+        </p:spPr>
+        <p:style>
+          <a:lnRef idx="1">
+            <a:schemeClr val="accent1"/>
+          </a:lnRef>
+          <a:fillRef idx="2">
+            <a:schemeClr val="accent1"/>
+          </a:fillRef>
+          <a:effectRef idx="1">
+            <a:schemeClr val="accent1"/>
+          </a:effectRef>
+          <a:fontRef idx="minor">
+            <a:schemeClr val="dk1"/>
+          </a:fontRef>
+        </p:style>
+      </p:cxnSp>
+      <p:sp>
+        <p:nvSpPr>
+          <p:cNvPr id="103" name="Rectangle 102">
+            <a:extLst>
+              <a:ext uri="{FF2B5EF4-FFF2-40B4-BE49-F238E27FC236}">
+                <a16:creationId xmlns:a16="http://schemas.microsoft.com/office/drawing/2014/main" id="{A13B574E-3DBC-4EE8-ACDD-D66B11DFF994}"/>
+              </a:ext>
+            </a:extLst>
+          </p:cNvPr>
+          <p:cNvSpPr/>
+          <p:nvPr/>
+        </p:nvSpPr>
+        <p:spPr>
+          <a:xfrm>
+            <a:off x="8117578" y="4097316"/>
+            <a:ext cx="138942" cy="266402"/>
+          </a:xfrm>
+          <a:prstGeom prst="rect">
+            <a:avLst/>
+          </a:prstGeom>
+          <a:solidFill>
+            <a:srgbClr val="0070C0"/>
+          </a:solidFill>
+          <a:ln>
+            <a:solidFill>
+              <a:srgbClr val="0070C0"/>
+            </a:solidFill>
+          </a:ln>
+          <a:effectLst/>
+        </p:spPr>
+        <p:style>
+          <a:lnRef idx="1">
+            <a:schemeClr val="accent3"/>
+          </a:lnRef>
+          <a:fillRef idx="2">
+            <a:schemeClr val="accent3"/>
+          </a:fillRef>
+          <a:effectRef idx="1">
+            <a:schemeClr val="accent3"/>
+          </a:effectRef>
+          <a:fontRef idx="minor">
+            <a:schemeClr val="dk1"/>
+          </a:fontRef>
+        </p:style>
+        <p:txBody>
+          <a:bodyPr rtlCol="0" anchor="ctr"/>
+          <a:lstStyle/>
+          <a:p>
+            <a:pPr algn="ctr"/>
+            <a:endParaRPr lang="en-SG" sz="1400">
+              <a:solidFill>
+                <a:prstClr val="black"/>
+              </a:solidFill>
+              <a:latin typeface="Calibri"/>
+            </a:endParaRPr>
+          </a:p>
+        </p:txBody>
+      </p:sp>
+      <p:cxnSp>
+        <p:nvCxnSpPr>
+          <p:cNvPr id="107" name="Straight Arrow Connector 106">
+            <a:extLst>
+              <a:ext uri="{FF2B5EF4-FFF2-40B4-BE49-F238E27FC236}">
+                <a16:creationId xmlns:a16="http://schemas.microsoft.com/office/drawing/2014/main" id="{4E152355-9291-4494-9655-286C83458D28}"/>
+              </a:ext>
+            </a:extLst>
+          </p:cNvPr>
+          <p:cNvCxnSpPr>
+            <a:cxnSpLocks/>
+          </p:cNvCxnSpPr>
+          <p:nvPr/>
+        </p:nvCxnSpPr>
+        <p:spPr>
+          <a:xfrm>
+            <a:off x="5689976" y="4097316"/>
+            <a:ext cx="2421648" cy="0"/>
+          </a:xfrm>
+          <a:prstGeom prst="straightConnector1">
+            <a:avLst/>
+          </a:prstGeom>
+          <a:ln w="19050">
+            <a:solidFill>
+              <a:srgbClr val="0070C0"/>
+            </a:solidFill>
+            <a:tailEnd type="arrow"/>
+          </a:ln>
+        </p:spPr>
+        <p:style>
+          <a:lnRef idx="1">
+            <a:schemeClr val="accent1"/>
+          </a:lnRef>
+          <a:fillRef idx="0">
+            <a:schemeClr val="accent1"/>
+          </a:fillRef>
+          <a:effectRef idx="0">
+            <a:schemeClr val="accent1"/>
+          </a:effectRef>
+          <a:fontRef idx="minor">
+            <a:schemeClr val="tx1"/>
+          </a:fontRef>
+        </p:style>
+      </p:cxnSp>
+      <p:sp>
+        <p:nvSpPr>
+          <p:cNvPr id="114" name="TextBox 113">
+            <a:extLst>
+              <a:ext uri="{FF2B5EF4-FFF2-40B4-BE49-F238E27FC236}">
+                <a16:creationId xmlns:a16="http://schemas.microsoft.com/office/drawing/2014/main" id="{CED1B44B-EFE6-42B0-8D8B-B466893BD71D}"/>
+              </a:ext>
+            </a:extLst>
+          </p:cNvPr>
+          <p:cNvSpPr txBox="1"/>
+          <p:nvPr/>
+        </p:nvSpPr>
+        <p:spPr>
+          <a:xfrm>
+            <a:off x="6821720" y="3966195"/>
+            <a:ext cx="1150818" cy="107722"/>
+          </a:xfrm>
+          <a:prstGeom prst="rect">
+            <a:avLst/>
+          </a:prstGeom>
+          <a:noFill/>
+        </p:spPr>
+        <p:txBody>
+          <a:bodyPr wrap="square" lIns="0" tIns="0" rIns="0" bIns="0" rtlCol="0">
+            <a:spAutoFit/>
+          </a:bodyPr>
+          <a:lstStyle>
+            <a:defPPr>
+              <a:defRPr lang="en-US"/>
+            </a:defPPr>
+            <a:lvl1pPr algn="r">
+              <a:defRPr sz="1400">
+                <a:solidFill>
+                  <a:srgbClr val="0070C0"/>
+                </a:solidFill>
+              </a:defRPr>
+            </a:lvl1pPr>
+          </a:lstStyle>
+          <a:p>
+            <a:r>
+              <a:rPr lang="en-US" sz="700" dirty="0" err="1">
+                <a:latin typeface="Calibri"/>
+              </a:rPr>
+              <a:t>updatePayments</a:t>
+            </a:r>
+            <a:r>
+              <a:rPr lang="en-US" sz="700" dirty="0">
+                <a:latin typeface="Calibri"/>
+              </a:rPr>
+              <a:t>(l, p)</a:t>
+            </a:r>
+          </a:p>
+        </p:txBody>
+      </p:sp>
+      <p:cxnSp>
+        <p:nvCxnSpPr>
+          <p:cNvPr id="115" name="Straight Arrow Connector 114">
+            <a:extLst>
+              <a:ext uri="{FF2B5EF4-FFF2-40B4-BE49-F238E27FC236}">
+                <a16:creationId xmlns:a16="http://schemas.microsoft.com/office/drawing/2014/main" id="{2639CACC-CC7D-4331-AA72-1D1467FB44F6}"/>
+              </a:ext>
+            </a:extLst>
+          </p:cNvPr>
+          <p:cNvCxnSpPr>
+            <a:cxnSpLocks/>
+          </p:cNvCxnSpPr>
+          <p:nvPr/>
+        </p:nvCxnSpPr>
+        <p:spPr>
+          <a:xfrm>
+            <a:off x="5655463" y="4363718"/>
+            <a:ext cx="2456160" cy="0"/>
+          </a:xfrm>
+          <a:prstGeom prst="straightConnector1">
+            <a:avLst/>
+          </a:prstGeom>
+          <a:ln w="19050">
+            <a:solidFill>
+              <a:srgbClr val="0070C0"/>
+            </a:solidFill>
+            <a:prstDash val="sysDash"/>
+            <a:headEnd type="arrow" w="med" len="med"/>
+            <a:tailEnd type="none" w="med" len="med"/>
+          </a:ln>
+        </p:spPr>
+        <p:style>
+          <a:lnRef idx="1">
+            <a:schemeClr val="accent1"/>
+          </a:lnRef>
+          <a:fillRef idx="0">
+            <a:schemeClr val="accent1"/>
+          </a:fillRef>
+          <a:effectRef idx="0">
+            <a:schemeClr val="accent1"/>
+          </a:effectRef>
+          <a:fontRef idx="minor">
+            <a:schemeClr val="tx1"/>
+          </a:fontRef>
+        </p:style>
+      </p:cxnSp>
+      <p:sp>
+        <p:nvSpPr>
+          <p:cNvPr id="118" name="TextBox 117">
+            <a:extLst>
+              <a:ext uri="{FF2B5EF4-FFF2-40B4-BE49-F238E27FC236}">
+                <a16:creationId xmlns:a16="http://schemas.microsoft.com/office/drawing/2014/main" id="{B1018812-7701-4C64-9079-4B7D21DAB831}"/>
+              </a:ext>
+            </a:extLst>
+          </p:cNvPr>
+          <p:cNvSpPr txBox="1"/>
+          <p:nvPr/>
+        </p:nvSpPr>
+        <p:spPr>
+          <a:xfrm>
+            <a:off x="5956475" y="4421462"/>
+            <a:ext cx="220343" cy="215444"/>
+          </a:xfrm>
+          <a:prstGeom prst="rect">
+            <a:avLst/>
+          </a:prstGeom>
+          <a:noFill/>
+        </p:spPr>
+        <p:txBody>
+          <a:bodyPr wrap="square" lIns="0" tIns="0" rIns="0" bIns="0" rtlCol="0">
+            <a:spAutoFit/>
+          </a:bodyPr>
+          <a:lstStyle>
+            <a:defPPr>
+              <a:defRPr lang="en-US"/>
+            </a:defPPr>
+            <a:lvl1pPr algn="r">
+              <a:defRPr sz="1400">
+                <a:solidFill>
+                  <a:srgbClr val="0070C0"/>
+                </a:solidFill>
+              </a:defRPr>
+            </a:lvl1pPr>
+          </a:lstStyle>
+          <a:p>
+            <a:r>
+              <a:rPr lang="en-US" dirty="0">
+                <a:latin typeface="Calibri"/>
+              </a:rPr>
+              <a:t>l</a:t>
+            </a:r>
           </a:p>
         </p:txBody>
       </p:sp>

</xml_diff>